<commit_message>
added study questions and updated powerpoint
</commit_message>
<xml_diff>
--- a/5Week-FrontEnd/FrontEnd-SDLC.pptx
+++ b/5Week-FrontEnd/FrontEnd-SDLC.pptx
@@ -5,7 +5,7 @@
     <p:sldMasterId id="2147483648" r:id="rId1"/>
   </p:sldMasterIdLst>
   <p:notesMasterIdLst>
-    <p:notesMasterId r:id="rId10"/>
+    <p:notesMasterId r:id="rId14"/>
   </p:notesMasterIdLst>
   <p:sldIdLst>
     <p:sldId id="256" r:id="rId2"/>
@@ -14,8 +14,12 @@
     <p:sldId id="259" r:id="rId5"/>
     <p:sldId id="260" r:id="rId6"/>
     <p:sldId id="261" r:id="rId7"/>
-    <p:sldId id="262" r:id="rId8"/>
-    <p:sldId id="263" r:id="rId9"/>
+    <p:sldId id="264" r:id="rId8"/>
+    <p:sldId id="265" r:id="rId9"/>
+    <p:sldId id="266" r:id="rId10"/>
+    <p:sldId id="267" r:id="rId11"/>
+    <p:sldId id="262" r:id="rId12"/>
+    <p:sldId id="263" r:id="rId13"/>
   </p:sldIdLst>
   <p:sldSz cx="12192000" cy="6858000"/>
   <p:notesSz cx="6858000" cy="9144000"/>
@@ -114,6 +118,11 @@
       </a:defRPr>
     </a:lvl9pPr>
   </p:defaultTextStyle>
+  <p:extLst>
+    <p:ext uri="{EFAFB233-063F-42B5-8137-9DF3F51BA10A}">
+      <p15:sldGuideLst xmlns:p15="http://schemas.microsoft.com/office/powerpoint/2012/main"/>
+    </p:ext>
+  </p:extLst>
 </p:presentation>
 </file>
 
@@ -199,7 +208,7 @@
           <a:p>
             <a:fld id="{53711AE8-47F5-4C2B-95DC-830CB5EC5957}" type="datetimeFigureOut">
               <a:rPr lang="en-US" smtClean="0"/>
-              <a:t>9/14/2020</a:t>
+              <a:t>9/15/2020</a:t>
             </a:fld>
             <a:endParaRPr lang="en-US"/>
           </a:p>
@@ -697,7 +706,7 @@
           <a:p>
             <a:fld id="{7240729C-CA27-4969-9500-66C0A4D7EAB6}" type="datetimeFigureOut">
               <a:rPr lang="en-US" smtClean="0"/>
-              <a:t>9/14/2020</a:t>
+              <a:t>9/15/2020</a:t>
             </a:fld>
             <a:endParaRPr lang="en-US"/>
           </a:p>
@@ -895,7 +904,7 @@
           <a:p>
             <a:fld id="{7240729C-CA27-4969-9500-66C0A4D7EAB6}" type="datetimeFigureOut">
               <a:rPr lang="en-US" smtClean="0"/>
-              <a:t>9/14/2020</a:t>
+              <a:t>9/15/2020</a:t>
             </a:fld>
             <a:endParaRPr lang="en-US"/>
           </a:p>
@@ -1103,7 +1112,7 @@
           <a:p>
             <a:fld id="{7240729C-CA27-4969-9500-66C0A4D7EAB6}" type="datetimeFigureOut">
               <a:rPr lang="en-US" smtClean="0"/>
-              <a:t>9/14/2020</a:t>
+              <a:t>9/15/2020</a:t>
             </a:fld>
             <a:endParaRPr lang="en-US"/>
           </a:p>
@@ -1301,7 +1310,7 @@
           <a:p>
             <a:fld id="{7240729C-CA27-4969-9500-66C0A4D7EAB6}" type="datetimeFigureOut">
               <a:rPr lang="en-US" smtClean="0"/>
-              <a:t>9/14/2020</a:t>
+              <a:t>9/15/2020</a:t>
             </a:fld>
             <a:endParaRPr lang="en-US"/>
           </a:p>
@@ -1576,7 +1585,7 @@
           <a:p>
             <a:fld id="{7240729C-CA27-4969-9500-66C0A4D7EAB6}" type="datetimeFigureOut">
               <a:rPr lang="en-US" smtClean="0"/>
-              <a:t>9/14/2020</a:t>
+              <a:t>9/15/2020</a:t>
             </a:fld>
             <a:endParaRPr lang="en-US"/>
           </a:p>
@@ -1841,7 +1850,7 @@
           <a:p>
             <a:fld id="{7240729C-CA27-4969-9500-66C0A4D7EAB6}" type="datetimeFigureOut">
               <a:rPr lang="en-US" smtClean="0"/>
-              <a:t>9/14/2020</a:t>
+              <a:t>9/15/2020</a:t>
             </a:fld>
             <a:endParaRPr lang="en-US"/>
           </a:p>
@@ -2253,7 +2262,7 @@
           <a:p>
             <a:fld id="{7240729C-CA27-4969-9500-66C0A4D7EAB6}" type="datetimeFigureOut">
               <a:rPr lang="en-US" smtClean="0"/>
-              <a:t>9/14/2020</a:t>
+              <a:t>9/15/2020</a:t>
             </a:fld>
             <a:endParaRPr lang="en-US"/>
           </a:p>
@@ -2394,7 +2403,7 @@
           <a:p>
             <a:fld id="{7240729C-CA27-4969-9500-66C0A4D7EAB6}" type="datetimeFigureOut">
               <a:rPr lang="en-US" smtClean="0"/>
-              <a:t>9/14/2020</a:t>
+              <a:t>9/15/2020</a:t>
             </a:fld>
             <a:endParaRPr lang="en-US"/>
           </a:p>
@@ -2507,7 +2516,7 @@
           <a:p>
             <a:fld id="{7240729C-CA27-4969-9500-66C0A4D7EAB6}" type="datetimeFigureOut">
               <a:rPr lang="en-US" smtClean="0"/>
-              <a:t>9/14/2020</a:t>
+              <a:t>9/15/2020</a:t>
             </a:fld>
             <a:endParaRPr lang="en-US"/>
           </a:p>
@@ -2818,7 +2827,7 @@
           <a:p>
             <a:fld id="{7240729C-CA27-4969-9500-66C0A4D7EAB6}" type="datetimeFigureOut">
               <a:rPr lang="en-US" smtClean="0"/>
-              <a:t>9/14/2020</a:t>
+              <a:t>9/15/2020</a:t>
             </a:fld>
             <a:endParaRPr lang="en-US"/>
           </a:p>
@@ -3106,7 +3115,7 @@
           <a:p>
             <a:fld id="{7240729C-CA27-4969-9500-66C0A4D7EAB6}" type="datetimeFigureOut">
               <a:rPr lang="en-US" smtClean="0"/>
-              <a:t>9/14/2020</a:t>
+              <a:t>9/15/2020</a:t>
             </a:fld>
             <a:endParaRPr lang="en-US"/>
           </a:p>
@@ -3347,7 +3356,7 @@
           <a:p>
             <a:fld id="{7240729C-CA27-4969-9500-66C0A4D7EAB6}" type="datetimeFigureOut">
               <a:rPr lang="en-US" smtClean="0"/>
-              <a:t>9/14/2020</a:t>
+              <a:t>9/15/2020</a:t>
             </a:fld>
             <a:endParaRPr lang="en-US"/>
           </a:p>
@@ -3830,6 +3839,939 @@
 </p:sld>
 </file>
 
+<file path=ppt/slides/slide10.xml><?xml version="1.0" encoding="utf-8"?>
+<p:sld xmlns:a="http://schemas.openxmlformats.org/drawingml/2006/main" xmlns:r="http://schemas.openxmlformats.org/officeDocument/2006/relationships" xmlns:p="http://schemas.openxmlformats.org/presentationml/2006/main">
+  <p:cSld>
+    <p:spTree>
+      <p:nvGrpSpPr>
+        <p:cNvPr id="1" name=""/>
+        <p:cNvGrpSpPr/>
+        <p:nvPr/>
+      </p:nvGrpSpPr>
+      <p:grpSpPr>
+        <a:xfrm>
+          <a:off x="0" y="0"/>
+          <a:ext cx="0" cy="0"/>
+          <a:chOff x="0" y="0"/>
+          <a:chExt cx="0" cy="0"/>
+        </a:xfrm>
+      </p:grpSpPr>
+      <p:sp>
+        <p:nvSpPr>
+          <p:cNvPr id="4" name="Oval 3">
+            <a:extLst>
+              <a:ext uri="{FF2B5EF4-FFF2-40B4-BE49-F238E27FC236}">
+                <a16:creationId xmlns:a16="http://schemas.microsoft.com/office/drawing/2014/main" id="{AF6DC957-783F-40D0-9479-3826D057D1C7}"/>
+              </a:ext>
+            </a:extLst>
+          </p:cNvPr>
+          <p:cNvSpPr/>
+          <p:nvPr/>
+        </p:nvSpPr>
+        <p:spPr>
+          <a:xfrm>
+            <a:off x="937589" y="1620078"/>
+            <a:ext cx="2146853" cy="1540565"/>
+          </a:xfrm>
+          <a:prstGeom prst="ellipse">
+            <a:avLst/>
+          </a:prstGeom>
+        </p:spPr>
+        <p:style>
+          <a:lnRef idx="2">
+            <a:schemeClr val="accent1">
+              <a:shade val="50000"/>
+            </a:schemeClr>
+          </a:lnRef>
+          <a:fillRef idx="1">
+            <a:schemeClr val="accent1"/>
+          </a:fillRef>
+          <a:effectRef idx="0">
+            <a:schemeClr val="accent1"/>
+          </a:effectRef>
+          <a:fontRef idx="minor">
+            <a:schemeClr val="lt1"/>
+          </a:fontRef>
+        </p:style>
+        <p:txBody>
+          <a:bodyPr rtlCol="0" anchor="ctr"/>
+          <a:lstStyle/>
+          <a:p>
+            <a:pPr algn="ctr"/>
+            <a:r>
+              <a:rPr lang="en-US" dirty="0"/>
+              <a:t>Local repository</a:t>
+            </a:r>
+          </a:p>
+        </p:txBody>
+      </p:sp>
+      <p:sp>
+        <p:nvSpPr>
+          <p:cNvPr id="6" name="Oval 5">
+            <a:extLst>
+              <a:ext uri="{FF2B5EF4-FFF2-40B4-BE49-F238E27FC236}">
+                <a16:creationId xmlns:a16="http://schemas.microsoft.com/office/drawing/2014/main" id="{519D5F60-2C6F-4D66-95A1-97F1778DC420}"/>
+              </a:ext>
+            </a:extLst>
+          </p:cNvPr>
+          <p:cNvSpPr/>
+          <p:nvPr/>
+        </p:nvSpPr>
+        <p:spPr>
+          <a:xfrm>
+            <a:off x="8272669" y="1282148"/>
+            <a:ext cx="2146853" cy="1540565"/>
+          </a:xfrm>
+          <a:prstGeom prst="ellipse">
+            <a:avLst/>
+          </a:prstGeom>
+        </p:spPr>
+        <p:style>
+          <a:lnRef idx="2">
+            <a:schemeClr val="accent1">
+              <a:shade val="50000"/>
+            </a:schemeClr>
+          </a:lnRef>
+          <a:fillRef idx="1">
+            <a:schemeClr val="accent1"/>
+          </a:fillRef>
+          <a:effectRef idx="0">
+            <a:schemeClr val="accent1"/>
+          </a:effectRef>
+          <a:fontRef idx="minor">
+            <a:schemeClr val="lt1"/>
+          </a:fontRef>
+        </p:style>
+        <p:txBody>
+          <a:bodyPr rtlCol="0" anchor="ctr"/>
+          <a:lstStyle/>
+          <a:p>
+            <a:pPr algn="ctr"/>
+            <a:r>
+              <a:rPr lang="en-US" dirty="0"/>
+              <a:t>remote repository</a:t>
+            </a:r>
+          </a:p>
+        </p:txBody>
+      </p:sp>
+      <p:pic>
+        <p:nvPicPr>
+          <p:cNvPr id="8" name="Graphic 7" descr="Internet">
+            <a:extLst>
+              <a:ext uri="{FF2B5EF4-FFF2-40B4-BE49-F238E27FC236}">
+                <a16:creationId xmlns:a16="http://schemas.microsoft.com/office/drawing/2014/main" id="{585F4ECA-762A-4EC7-86D2-6976BE6E5F6E}"/>
+              </a:ext>
+            </a:extLst>
+          </p:cNvPr>
+          <p:cNvPicPr>
+            <a:picLocks noChangeAspect="1"/>
+          </p:cNvPicPr>
+          <p:nvPr/>
+        </p:nvPicPr>
+        <p:blipFill>
+          <a:blip r:embed="rId2">
+            <a:extLst>
+              <a:ext uri="{28A0092B-C50C-407E-A947-70E740481C1C}">
+                <a14:useLocalDpi xmlns:a14="http://schemas.microsoft.com/office/drawing/2010/main" val="0"/>
+              </a:ext>
+              <a:ext uri="{96DAC541-7B7A-43D3-8B79-37D633B846F1}">
+                <asvg:svgBlip xmlns:asvg="http://schemas.microsoft.com/office/drawing/2016/SVG/main" r:embed="rId3"/>
+              </a:ext>
+            </a:extLst>
+          </a:blip>
+          <a:stretch>
+            <a:fillRect/>
+          </a:stretch>
+        </p:blipFill>
+        <p:spPr>
+          <a:xfrm>
+            <a:off x="1123121" y="2915480"/>
+            <a:ext cx="1775791" cy="1775791"/>
+          </a:xfrm>
+          <a:prstGeom prst="rect">
+            <a:avLst/>
+          </a:prstGeom>
+        </p:spPr>
+      </p:pic>
+      <p:pic>
+        <p:nvPicPr>
+          <p:cNvPr id="10" name="Graphic 9" descr="Server">
+            <a:extLst>
+              <a:ext uri="{FF2B5EF4-FFF2-40B4-BE49-F238E27FC236}">
+                <a16:creationId xmlns:a16="http://schemas.microsoft.com/office/drawing/2014/main" id="{66F405ED-4EEA-4BD9-95AE-4FD7A402983A}"/>
+              </a:ext>
+            </a:extLst>
+          </p:cNvPr>
+          <p:cNvPicPr>
+            <a:picLocks noChangeAspect="1"/>
+          </p:cNvPicPr>
+          <p:nvPr/>
+        </p:nvPicPr>
+        <p:blipFill>
+          <a:blip r:embed="rId4">
+            <a:extLst>
+              <a:ext uri="{28A0092B-C50C-407E-A947-70E740481C1C}">
+                <a14:useLocalDpi xmlns:a14="http://schemas.microsoft.com/office/drawing/2010/main" val="0"/>
+              </a:ext>
+              <a:ext uri="{96DAC541-7B7A-43D3-8B79-37D633B846F1}">
+                <asvg:svgBlip xmlns:asvg="http://schemas.microsoft.com/office/drawing/2016/SVG/main" r:embed="rId5"/>
+              </a:ext>
+            </a:extLst>
+          </a:blip>
+          <a:stretch>
+            <a:fillRect/>
+          </a:stretch>
+        </p:blipFill>
+        <p:spPr>
+          <a:xfrm>
+            <a:off x="8272669" y="2822713"/>
+            <a:ext cx="1858618" cy="1858618"/>
+          </a:xfrm>
+          <a:prstGeom prst="rect">
+            <a:avLst/>
+          </a:prstGeom>
+        </p:spPr>
+      </p:pic>
+      <p:sp>
+        <p:nvSpPr>
+          <p:cNvPr id="13" name="Rectangle 12">
+            <a:extLst>
+              <a:ext uri="{FF2B5EF4-FFF2-40B4-BE49-F238E27FC236}">
+                <a16:creationId xmlns:a16="http://schemas.microsoft.com/office/drawing/2014/main" id="{6FA814F1-C42B-46F8-95CD-2F54D1FB6AF6}"/>
+              </a:ext>
+            </a:extLst>
+          </p:cNvPr>
+          <p:cNvSpPr/>
+          <p:nvPr/>
+        </p:nvSpPr>
+        <p:spPr>
+          <a:xfrm>
+            <a:off x="1159566" y="1089992"/>
+            <a:ext cx="1769165" cy="384311"/>
+          </a:xfrm>
+          <a:prstGeom prst="rect">
+            <a:avLst/>
+          </a:prstGeom>
+        </p:spPr>
+        <p:style>
+          <a:lnRef idx="2">
+            <a:schemeClr val="accent4">
+              <a:shade val="50000"/>
+            </a:schemeClr>
+          </a:lnRef>
+          <a:fillRef idx="1">
+            <a:schemeClr val="accent4"/>
+          </a:fillRef>
+          <a:effectRef idx="0">
+            <a:schemeClr val="accent4"/>
+          </a:effectRef>
+          <a:fontRef idx="minor">
+            <a:schemeClr val="lt1"/>
+          </a:fontRef>
+        </p:style>
+        <p:txBody>
+          <a:bodyPr rtlCol="0" anchor="ctr"/>
+          <a:lstStyle/>
+          <a:p>
+            <a:pPr algn="ctr"/>
+            <a:r>
+              <a:rPr lang="en-US" dirty="0"/>
+              <a:t>master</a:t>
+            </a:r>
+          </a:p>
+        </p:txBody>
+      </p:sp>
+      <p:sp>
+        <p:nvSpPr>
+          <p:cNvPr id="15" name="Rectangle 14">
+            <a:extLst>
+              <a:ext uri="{FF2B5EF4-FFF2-40B4-BE49-F238E27FC236}">
+                <a16:creationId xmlns:a16="http://schemas.microsoft.com/office/drawing/2014/main" id="{5EBE15AF-1DA2-4435-B1A3-59C2FFB70B55}"/>
+              </a:ext>
+            </a:extLst>
+          </p:cNvPr>
+          <p:cNvSpPr/>
+          <p:nvPr/>
+        </p:nvSpPr>
+        <p:spPr>
+          <a:xfrm>
+            <a:off x="8378686" y="319710"/>
+            <a:ext cx="1769165" cy="384311"/>
+          </a:xfrm>
+          <a:prstGeom prst="rect">
+            <a:avLst/>
+          </a:prstGeom>
+        </p:spPr>
+        <p:style>
+          <a:lnRef idx="2">
+            <a:schemeClr val="accent4">
+              <a:shade val="50000"/>
+            </a:schemeClr>
+          </a:lnRef>
+          <a:fillRef idx="1">
+            <a:schemeClr val="accent4"/>
+          </a:fillRef>
+          <a:effectRef idx="0">
+            <a:schemeClr val="accent4"/>
+          </a:effectRef>
+          <a:fontRef idx="minor">
+            <a:schemeClr val="lt1"/>
+          </a:fontRef>
+        </p:style>
+        <p:txBody>
+          <a:bodyPr rtlCol="0" anchor="ctr"/>
+          <a:lstStyle/>
+          <a:p>
+            <a:pPr algn="ctr"/>
+            <a:r>
+              <a:rPr lang="en-US" dirty="0"/>
+              <a:t>master</a:t>
+            </a:r>
+          </a:p>
+        </p:txBody>
+      </p:sp>
+      <p:sp>
+        <p:nvSpPr>
+          <p:cNvPr id="17" name="Rectangle 16">
+            <a:extLst>
+              <a:ext uri="{FF2B5EF4-FFF2-40B4-BE49-F238E27FC236}">
+                <a16:creationId xmlns:a16="http://schemas.microsoft.com/office/drawing/2014/main" id="{DA53F8E6-23CD-4356-B6D5-3DD09266274E}"/>
+              </a:ext>
+            </a:extLst>
+          </p:cNvPr>
+          <p:cNvSpPr/>
+          <p:nvPr/>
+        </p:nvSpPr>
+        <p:spPr>
+          <a:xfrm>
+            <a:off x="8378686" y="800929"/>
+            <a:ext cx="1769165" cy="384311"/>
+          </a:xfrm>
+          <a:prstGeom prst="rect">
+            <a:avLst/>
+          </a:prstGeom>
+        </p:spPr>
+        <p:style>
+          <a:lnRef idx="2">
+            <a:schemeClr val="accent4">
+              <a:shade val="50000"/>
+            </a:schemeClr>
+          </a:lnRef>
+          <a:fillRef idx="1">
+            <a:schemeClr val="accent4"/>
+          </a:fillRef>
+          <a:effectRef idx="0">
+            <a:schemeClr val="accent4"/>
+          </a:effectRef>
+          <a:fontRef idx="minor">
+            <a:schemeClr val="lt1"/>
+          </a:fontRef>
+        </p:style>
+        <p:txBody>
+          <a:bodyPr rtlCol="0" anchor="ctr"/>
+          <a:lstStyle/>
+          <a:p>
+            <a:pPr algn="ctr"/>
+            <a:r>
+              <a:rPr lang="en-US" dirty="0"/>
+              <a:t>Nav-branch</a:t>
+            </a:r>
+          </a:p>
+        </p:txBody>
+      </p:sp>
+      <p:cxnSp>
+        <p:nvCxnSpPr>
+          <p:cNvPr id="3" name="Straight Connector 2">
+            <a:extLst>
+              <a:ext uri="{FF2B5EF4-FFF2-40B4-BE49-F238E27FC236}">
+                <a16:creationId xmlns:a16="http://schemas.microsoft.com/office/drawing/2014/main" id="{01834484-0AE4-4B25-A870-D228B174D390}"/>
+              </a:ext>
+            </a:extLst>
+          </p:cNvPr>
+          <p:cNvCxnSpPr/>
+          <p:nvPr/>
+        </p:nvCxnSpPr>
+        <p:spPr>
+          <a:xfrm>
+            <a:off x="3240157" y="2390360"/>
+            <a:ext cx="4909930" cy="17391"/>
+          </a:xfrm>
+          <a:prstGeom prst="line">
+            <a:avLst/>
+          </a:prstGeom>
+          <a:ln w="76200"/>
+        </p:spPr>
+        <p:style>
+          <a:lnRef idx="1">
+            <a:schemeClr val="accent1"/>
+          </a:lnRef>
+          <a:fillRef idx="0">
+            <a:schemeClr val="accent1"/>
+          </a:fillRef>
+          <a:effectRef idx="0">
+            <a:schemeClr val="accent1"/>
+          </a:effectRef>
+          <a:fontRef idx="minor">
+            <a:schemeClr val="tx1"/>
+          </a:fontRef>
+        </p:style>
+      </p:cxnSp>
+      <p:sp>
+        <p:nvSpPr>
+          <p:cNvPr id="5" name="Explosion: 8 Points 4">
+            <a:extLst>
+              <a:ext uri="{FF2B5EF4-FFF2-40B4-BE49-F238E27FC236}">
+                <a16:creationId xmlns:a16="http://schemas.microsoft.com/office/drawing/2014/main" id="{610C97FC-287B-4FB3-BBDF-000FCB77985D}"/>
+              </a:ext>
+            </a:extLst>
+          </p:cNvPr>
+          <p:cNvSpPr/>
+          <p:nvPr/>
+        </p:nvSpPr>
+        <p:spPr>
+          <a:xfrm>
+            <a:off x="9743660" y="1349236"/>
+            <a:ext cx="1361662" cy="725556"/>
+          </a:xfrm>
+          <a:prstGeom prst="irregularSeal1">
+            <a:avLst/>
+          </a:prstGeom>
+        </p:spPr>
+        <p:style>
+          <a:lnRef idx="2">
+            <a:schemeClr val="accent4">
+              <a:shade val="50000"/>
+            </a:schemeClr>
+          </a:lnRef>
+          <a:fillRef idx="1">
+            <a:schemeClr val="accent4"/>
+          </a:fillRef>
+          <a:effectRef idx="0">
+            <a:schemeClr val="accent4"/>
+          </a:effectRef>
+          <a:fontRef idx="minor">
+            <a:schemeClr val="lt1"/>
+          </a:fontRef>
+        </p:style>
+        <p:txBody>
+          <a:bodyPr rtlCol="0" anchor="ctr"/>
+          <a:lstStyle/>
+          <a:p>
+            <a:pPr algn="ctr"/>
+            <a:r>
+              <a:rPr lang="en-US" dirty="0"/>
+              <a:t>origin</a:t>
+            </a:r>
+          </a:p>
+        </p:txBody>
+      </p:sp>
+      <p:sp>
+        <p:nvSpPr>
+          <p:cNvPr id="7" name="Scroll: Vertical 6">
+            <a:extLst>
+              <a:ext uri="{FF2B5EF4-FFF2-40B4-BE49-F238E27FC236}">
+                <a16:creationId xmlns:a16="http://schemas.microsoft.com/office/drawing/2014/main" id="{3C4546A1-1CB5-49C4-B9EB-8009811CCA45}"/>
+              </a:ext>
+            </a:extLst>
+          </p:cNvPr>
+          <p:cNvSpPr/>
+          <p:nvPr/>
+        </p:nvSpPr>
+        <p:spPr>
+          <a:xfrm>
+            <a:off x="3786809" y="3160643"/>
+            <a:ext cx="4114800" cy="3302279"/>
+          </a:xfrm>
+          <a:prstGeom prst="verticalScroll">
+            <a:avLst/>
+          </a:prstGeom>
+        </p:spPr>
+        <p:style>
+          <a:lnRef idx="2">
+            <a:schemeClr val="accent4">
+              <a:shade val="50000"/>
+            </a:schemeClr>
+          </a:lnRef>
+          <a:fillRef idx="1">
+            <a:schemeClr val="accent4"/>
+          </a:fillRef>
+          <a:effectRef idx="0">
+            <a:schemeClr val="accent4"/>
+          </a:effectRef>
+          <a:fontRef idx="minor">
+            <a:schemeClr val="lt1"/>
+          </a:fontRef>
+        </p:style>
+        <p:txBody>
+          <a:bodyPr rtlCol="0" anchor="ctr"/>
+          <a:lstStyle/>
+          <a:p>
+            <a:pPr algn="ctr"/>
+            <a:r>
+              <a:rPr lang="en-US" dirty="0"/>
+              <a:t>git clone is the same as….</a:t>
+            </a:r>
+          </a:p>
+          <a:p>
+            <a:pPr algn="ctr"/>
+            <a:endParaRPr lang="en-US" dirty="0"/>
+          </a:p>
+          <a:p>
+            <a:pPr marL="342900" indent="-342900" algn="ctr">
+              <a:buAutoNum type="arabicPeriod"/>
+            </a:pPr>
+            <a:r>
+              <a:rPr lang="en-US" dirty="0"/>
+              <a:t>git </a:t>
+            </a:r>
+            <a:r>
+              <a:rPr lang="en-US" dirty="0" err="1"/>
+              <a:t>init</a:t>
+            </a:r>
+            <a:endParaRPr lang="en-US" dirty="0"/>
+          </a:p>
+          <a:p>
+            <a:pPr marL="342900" indent="-342900" algn="ctr">
+              <a:buAutoNum type="arabicPeriod"/>
+            </a:pPr>
+            <a:r>
+              <a:rPr lang="en-US" dirty="0"/>
+              <a:t>git remote add origin {{</a:t>
+            </a:r>
+            <a:r>
+              <a:rPr lang="en-US" dirty="0" err="1"/>
+              <a:t>url</a:t>
+            </a:r>
+            <a:r>
+              <a:rPr lang="en-US" dirty="0"/>
+              <a:t>}}</a:t>
+            </a:r>
+          </a:p>
+          <a:p>
+            <a:pPr marL="342900" indent="-342900" algn="ctr">
+              <a:buAutoNum type="arabicPeriod"/>
+            </a:pPr>
+            <a:r>
+              <a:rPr lang="en-US" dirty="0"/>
+              <a:t>git pull origin master</a:t>
+            </a:r>
+          </a:p>
+        </p:txBody>
+      </p:sp>
+    </p:spTree>
+    <p:extLst>
+      <p:ext uri="{BB962C8B-B14F-4D97-AF65-F5344CB8AC3E}">
+        <p14:creationId xmlns:p14="http://schemas.microsoft.com/office/powerpoint/2010/main" val="1989951159"/>
+      </p:ext>
+    </p:extLst>
+  </p:cSld>
+  <p:clrMapOvr>
+    <a:masterClrMapping/>
+  </p:clrMapOvr>
+</p:sld>
+</file>
+
+<file path=ppt/slides/slide11.xml><?xml version="1.0" encoding="utf-8"?>
+<p:sld xmlns:a="http://schemas.openxmlformats.org/drawingml/2006/main" xmlns:r="http://schemas.openxmlformats.org/officeDocument/2006/relationships" xmlns:p="http://schemas.openxmlformats.org/presentationml/2006/main">
+  <p:cSld>
+    <p:bg>
+      <p:bgPr>
+        <a:solidFill>
+          <a:schemeClr val="bg1"/>
+        </a:solidFill>
+        <a:effectLst/>
+      </p:bgPr>
+    </p:bg>
+    <p:spTree>
+      <p:nvGrpSpPr>
+        <p:cNvPr id="1" name=""/>
+        <p:cNvGrpSpPr/>
+        <p:nvPr/>
+      </p:nvGrpSpPr>
+      <p:grpSpPr>
+        <a:xfrm>
+          <a:off x="0" y="0"/>
+          <a:ext cx="0" cy="0"/>
+          <a:chOff x="0" y="0"/>
+          <a:chExt cx="0" cy="0"/>
+        </a:xfrm>
+      </p:grpSpPr>
+      <p:sp>
+        <p:nvSpPr>
+          <p:cNvPr id="2" name="Title 1">
+            <a:extLst>
+              <a:ext uri="{FF2B5EF4-FFF2-40B4-BE49-F238E27FC236}">
+                <a16:creationId xmlns:a16="http://schemas.microsoft.com/office/drawing/2014/main" id="{327E1693-2666-4D48-9CFA-C4CC365BF226}"/>
+              </a:ext>
+            </a:extLst>
+          </p:cNvPr>
+          <p:cNvSpPr>
+            <a:spLocks noGrp="1"/>
+          </p:cNvSpPr>
+          <p:nvPr>
+            <p:ph type="title"/>
+          </p:nvPr>
+        </p:nvSpPr>
+        <p:spPr>
+          <a:xfrm>
+            <a:off x="960100" y="978102"/>
+            <a:ext cx="10588434" cy="1062644"/>
+          </a:xfrm>
+        </p:spPr>
+        <p:txBody>
+          <a:bodyPr anchor="b">
+            <a:normAutofit/>
+          </a:bodyPr>
+          <a:lstStyle/>
+          <a:p>
+            <a:r>
+              <a:rPr lang="en-US" dirty="0"/>
+              <a:t>Things that I like about the tech.</a:t>
+            </a:r>
+          </a:p>
+        </p:txBody>
+      </p:sp>
+      <p:cxnSp>
+        <p:nvCxnSpPr>
+          <p:cNvPr id="12" name="Straight Connector 11">
+            <a:extLst>
+              <a:ext uri="{FF2B5EF4-FFF2-40B4-BE49-F238E27FC236}">
+                <a16:creationId xmlns:a16="http://schemas.microsoft.com/office/drawing/2014/main" id="{39B7FDC9-F0CE-43A7-9F2A-83DD09DC3453}"/>
+              </a:ext>
+              <a:ext uri="{C183D7F6-B498-43B3-948B-1728B52AA6E4}">
+                <adec:decorative xmlns:adec="http://schemas.microsoft.com/office/drawing/2017/decorative" val="1"/>
+              </a:ext>
+            </a:extLst>
+          </p:cNvPr>
+          <p:cNvCxnSpPr>
+            <a:cxnSpLocks noGrp="1" noRot="1" noChangeAspect="1" noMove="1" noResize="1" noEditPoints="1" noAdjustHandles="1" noChangeArrowheads="1" noChangeShapeType="1"/>
+          </p:cNvCxnSpPr>
+          <p:nvPr>
+            <p:extLst>
+              <p:ext uri="{386F3935-93C4-4BCD-93E2-E3B085C9AB24}">
+                <p16:designElem xmlns:p16="http://schemas.microsoft.com/office/powerpoint/2015/main" val="1"/>
+              </p:ext>
+            </p:extLst>
+          </p:nvPr>
+        </p:nvCxnSpPr>
+        <p:spPr>
+          <a:xfrm>
+            <a:off x="1047624" y="2265037"/>
+            <a:ext cx="10125012" cy="0"/>
+          </a:xfrm>
+          <a:prstGeom prst="line">
+            <a:avLst/>
+          </a:prstGeom>
+          <a:ln w="15875">
+            <a:solidFill>
+              <a:schemeClr val="tx1">
+                <a:lumMod val="65000"/>
+                <a:lumOff val="35000"/>
+              </a:schemeClr>
+            </a:solidFill>
+          </a:ln>
+        </p:spPr>
+        <p:style>
+          <a:lnRef idx="1">
+            <a:schemeClr val="accent1"/>
+          </a:lnRef>
+          <a:fillRef idx="0">
+            <a:schemeClr val="accent1"/>
+          </a:fillRef>
+          <a:effectRef idx="0">
+            <a:schemeClr val="accent1"/>
+          </a:effectRef>
+          <a:fontRef idx="minor">
+            <a:schemeClr val="tx1"/>
+          </a:fontRef>
+        </p:style>
+      </p:cxnSp>
+      <p:pic>
+        <p:nvPicPr>
+          <p:cNvPr id="5" name="Content Placeholder 4" descr="Angel face with solid fill">
+            <a:extLst>
+              <a:ext uri="{FF2B5EF4-FFF2-40B4-BE49-F238E27FC236}">
+                <a16:creationId xmlns:a16="http://schemas.microsoft.com/office/drawing/2014/main" id="{831A082B-9A5E-4DF2-B2E5-B3DB1B6C21F4}"/>
+              </a:ext>
+            </a:extLst>
+          </p:cNvPr>
+          <p:cNvPicPr>
+            <a:picLocks noChangeAspect="1"/>
+          </p:cNvPicPr>
+          <p:nvPr/>
+        </p:nvPicPr>
+        <p:blipFill>
+          <a:blip r:embed="rId2">
+            <a:extLst>
+              <a:ext uri="{28A0092B-C50C-407E-A947-70E740481C1C}">
+                <a14:useLocalDpi xmlns:a14="http://schemas.microsoft.com/office/drawing/2010/main" val="0"/>
+              </a:ext>
+              <a:ext uri="{96DAC541-7B7A-43D3-8B79-37D633B846F1}">
+                <asvg:svgBlip xmlns:asvg="http://schemas.microsoft.com/office/drawing/2016/SVG/main" r:embed="rId3"/>
+              </a:ext>
+            </a:extLst>
+          </a:blip>
+          <a:stretch>
+            <a:fillRect/>
+          </a:stretch>
+        </p:blipFill>
+        <p:spPr>
+          <a:xfrm>
+            <a:off x="1333206" y="2811104"/>
+            <a:ext cx="2928114" cy="2928114"/>
+          </a:xfrm>
+          <a:prstGeom prst="rect">
+            <a:avLst/>
+          </a:prstGeom>
+        </p:spPr>
+      </p:pic>
+      <p:sp>
+        <p:nvSpPr>
+          <p:cNvPr id="9" name="Content Placeholder 8">
+            <a:extLst>
+              <a:ext uri="{FF2B5EF4-FFF2-40B4-BE49-F238E27FC236}">
+                <a16:creationId xmlns:a16="http://schemas.microsoft.com/office/drawing/2014/main" id="{643115F0-0C4F-4E88-9D42-E6C8EBF41A53}"/>
+              </a:ext>
+            </a:extLst>
+          </p:cNvPr>
+          <p:cNvSpPr>
+            <a:spLocks noGrp="1"/>
+          </p:cNvSpPr>
+          <p:nvPr>
+            <p:ph idx="1"/>
+          </p:nvPr>
+        </p:nvSpPr>
+        <p:spPr>
+          <a:xfrm>
+            <a:off x="4955354" y="2682433"/>
+            <a:ext cx="6282169" cy="3215749"/>
+          </a:xfrm>
+        </p:spPr>
+        <p:txBody>
+          <a:bodyPr>
+            <a:normAutofit/>
+          </a:bodyPr>
+          <a:lstStyle/>
+          <a:p>
+            <a:endParaRPr lang="en-US" sz="2400"/>
+          </a:p>
+        </p:txBody>
+      </p:sp>
+    </p:spTree>
+    <p:extLst>
+      <p:ext uri="{BB962C8B-B14F-4D97-AF65-F5344CB8AC3E}">
+        <p14:creationId xmlns:p14="http://schemas.microsoft.com/office/powerpoint/2010/main" val="275338840"/>
+      </p:ext>
+    </p:extLst>
+  </p:cSld>
+  <p:clrMapOvr>
+    <a:masterClrMapping/>
+  </p:clrMapOvr>
+</p:sld>
+</file>
+
+<file path=ppt/slides/slide12.xml><?xml version="1.0" encoding="utf-8"?>
+<p:sld xmlns:a="http://schemas.openxmlformats.org/drawingml/2006/main" xmlns:r="http://schemas.openxmlformats.org/officeDocument/2006/relationships" xmlns:p="http://schemas.openxmlformats.org/presentationml/2006/main">
+  <p:cSld>
+    <p:bg>
+      <p:bgPr>
+        <a:solidFill>
+          <a:schemeClr val="bg1"/>
+        </a:solidFill>
+        <a:effectLst/>
+      </p:bgPr>
+    </p:bg>
+    <p:spTree>
+      <p:nvGrpSpPr>
+        <p:cNvPr id="1" name=""/>
+        <p:cNvGrpSpPr/>
+        <p:nvPr/>
+      </p:nvGrpSpPr>
+      <p:grpSpPr>
+        <a:xfrm>
+          <a:off x="0" y="0"/>
+          <a:ext cx="0" cy="0"/>
+          <a:chOff x="0" y="0"/>
+          <a:chExt cx="0" cy="0"/>
+        </a:xfrm>
+      </p:grpSpPr>
+      <p:sp>
+        <p:nvSpPr>
+          <p:cNvPr id="2" name="Title 1">
+            <a:extLst>
+              <a:ext uri="{FF2B5EF4-FFF2-40B4-BE49-F238E27FC236}">
+                <a16:creationId xmlns:a16="http://schemas.microsoft.com/office/drawing/2014/main" id="{0CC0E406-D236-41FD-BF23-D5B48575375E}"/>
+              </a:ext>
+            </a:extLst>
+          </p:cNvPr>
+          <p:cNvSpPr>
+            <a:spLocks noGrp="1"/>
+          </p:cNvSpPr>
+          <p:nvPr>
+            <p:ph type="title"/>
+          </p:nvPr>
+        </p:nvSpPr>
+        <p:spPr>
+          <a:xfrm>
+            <a:off x="960100" y="978102"/>
+            <a:ext cx="10588434" cy="1062644"/>
+          </a:xfrm>
+        </p:spPr>
+        <p:txBody>
+          <a:bodyPr anchor="b">
+            <a:normAutofit/>
+          </a:bodyPr>
+          <a:lstStyle/>
+          <a:p>
+            <a:r>
+              <a:rPr lang="en-US" dirty="0"/>
+              <a:t>Things that frustrate me</a:t>
+            </a:r>
+          </a:p>
+        </p:txBody>
+      </p:sp>
+      <p:cxnSp>
+        <p:nvCxnSpPr>
+          <p:cNvPr id="12" name="Straight Connector 11">
+            <a:extLst>
+              <a:ext uri="{FF2B5EF4-FFF2-40B4-BE49-F238E27FC236}">
+                <a16:creationId xmlns:a16="http://schemas.microsoft.com/office/drawing/2014/main" id="{39B7FDC9-F0CE-43A7-9F2A-83DD09DC3453}"/>
+              </a:ext>
+              <a:ext uri="{C183D7F6-B498-43B3-948B-1728B52AA6E4}">
+                <adec:decorative xmlns:adec="http://schemas.microsoft.com/office/drawing/2017/decorative" val="1"/>
+              </a:ext>
+            </a:extLst>
+          </p:cNvPr>
+          <p:cNvCxnSpPr>
+            <a:cxnSpLocks noGrp="1" noRot="1" noChangeAspect="1" noMove="1" noResize="1" noEditPoints="1" noAdjustHandles="1" noChangeArrowheads="1" noChangeShapeType="1"/>
+          </p:cNvCxnSpPr>
+          <p:nvPr>
+            <p:extLst>
+              <p:ext uri="{386F3935-93C4-4BCD-93E2-E3B085C9AB24}">
+                <p16:designElem xmlns:p16="http://schemas.microsoft.com/office/powerpoint/2015/main" val="1"/>
+              </p:ext>
+            </p:extLst>
+          </p:nvPr>
+        </p:nvCxnSpPr>
+        <p:spPr>
+          <a:xfrm>
+            <a:off x="1047624" y="2265037"/>
+            <a:ext cx="10125012" cy="0"/>
+          </a:xfrm>
+          <a:prstGeom prst="line">
+            <a:avLst/>
+          </a:prstGeom>
+          <a:ln w="15875">
+            <a:solidFill>
+              <a:schemeClr val="tx1">
+                <a:lumMod val="65000"/>
+                <a:lumOff val="35000"/>
+              </a:schemeClr>
+            </a:solidFill>
+          </a:ln>
+        </p:spPr>
+        <p:style>
+          <a:lnRef idx="1">
+            <a:schemeClr val="accent1"/>
+          </a:lnRef>
+          <a:fillRef idx="0">
+            <a:schemeClr val="accent1"/>
+          </a:fillRef>
+          <a:effectRef idx="0">
+            <a:schemeClr val="accent1"/>
+          </a:effectRef>
+          <a:fontRef idx="minor">
+            <a:schemeClr val="tx1"/>
+          </a:fontRef>
+        </p:style>
+      </p:cxnSp>
+      <p:pic>
+        <p:nvPicPr>
+          <p:cNvPr id="5" name="Content Placeholder 4" descr="Angry face with solid fill">
+            <a:extLst>
+              <a:ext uri="{FF2B5EF4-FFF2-40B4-BE49-F238E27FC236}">
+                <a16:creationId xmlns:a16="http://schemas.microsoft.com/office/drawing/2014/main" id="{2EB60041-0F09-4973-8194-7C666875443C}"/>
+              </a:ext>
+            </a:extLst>
+          </p:cNvPr>
+          <p:cNvPicPr>
+            <a:picLocks noChangeAspect="1"/>
+          </p:cNvPicPr>
+          <p:nvPr/>
+        </p:nvPicPr>
+        <p:blipFill>
+          <a:blip r:embed="rId2">
+            <a:extLst>
+              <a:ext uri="{28A0092B-C50C-407E-A947-70E740481C1C}">
+                <a14:useLocalDpi xmlns:a14="http://schemas.microsoft.com/office/drawing/2010/main" val="0"/>
+              </a:ext>
+              <a:ext uri="{96DAC541-7B7A-43D3-8B79-37D633B846F1}">
+                <asvg:svgBlip xmlns:asvg="http://schemas.microsoft.com/office/drawing/2016/SVG/main" r:embed="rId3"/>
+              </a:ext>
+            </a:extLst>
+          </a:blip>
+          <a:stretch>
+            <a:fillRect/>
+          </a:stretch>
+        </p:blipFill>
+        <p:spPr>
+          <a:xfrm>
+            <a:off x="1333206" y="2811104"/>
+            <a:ext cx="2928114" cy="2928114"/>
+          </a:xfrm>
+          <a:prstGeom prst="rect">
+            <a:avLst/>
+          </a:prstGeom>
+        </p:spPr>
+      </p:pic>
+      <p:sp>
+        <p:nvSpPr>
+          <p:cNvPr id="9" name="Content Placeholder 8">
+            <a:extLst>
+              <a:ext uri="{FF2B5EF4-FFF2-40B4-BE49-F238E27FC236}">
+                <a16:creationId xmlns:a16="http://schemas.microsoft.com/office/drawing/2014/main" id="{51A97855-A477-4D14-B59D-B034082F63BD}"/>
+              </a:ext>
+            </a:extLst>
+          </p:cNvPr>
+          <p:cNvSpPr>
+            <a:spLocks noGrp="1"/>
+          </p:cNvSpPr>
+          <p:nvPr>
+            <p:ph idx="1"/>
+          </p:nvPr>
+        </p:nvSpPr>
+        <p:spPr>
+          <a:xfrm>
+            <a:off x="4955354" y="2682433"/>
+            <a:ext cx="6282169" cy="3215749"/>
+          </a:xfrm>
+        </p:spPr>
+        <p:txBody>
+          <a:bodyPr>
+            <a:normAutofit/>
+          </a:bodyPr>
+          <a:lstStyle/>
+          <a:p>
+            <a:r>
+              <a:rPr lang="en-US" sz="2400" dirty="0"/>
+              <a:t>Standup meetings (mostly standing up)</a:t>
+            </a:r>
+          </a:p>
+        </p:txBody>
+      </p:sp>
+    </p:spTree>
+    <p:extLst>
+      <p:ext uri="{BB962C8B-B14F-4D97-AF65-F5344CB8AC3E}">
+        <p14:creationId xmlns:p14="http://schemas.microsoft.com/office/powerpoint/2010/main" val="2292001013"/>
+      </p:ext>
+    </p:extLst>
+  </p:cSld>
+  <p:clrMapOvr>
+    <a:masterClrMapping/>
+  </p:clrMapOvr>
+</p:sld>
+</file>
+
 <file path=ppt/slides/slide2.xml><?xml version="1.0" encoding="utf-8"?>
 <p:sld xmlns:a="http://schemas.openxmlformats.org/drawingml/2006/main" xmlns:r="http://schemas.openxmlformats.org/officeDocument/2006/relationships" xmlns:p="http://schemas.openxmlformats.org/presentationml/2006/main">
   <p:cSld>
@@ -4917,14 +5859,6 @@
 <file path=ppt/slides/slide7.xml><?xml version="1.0" encoding="utf-8"?>
 <p:sld xmlns:a="http://schemas.openxmlformats.org/drawingml/2006/main" xmlns:r="http://schemas.openxmlformats.org/officeDocument/2006/relationships" xmlns:p="http://schemas.openxmlformats.org/presentationml/2006/main">
   <p:cSld>
-    <p:bg>
-      <p:bgPr>
-        <a:solidFill>
-          <a:schemeClr val="bg1"/>
-        </a:solidFill>
-        <a:effectLst/>
-      </p:bgPr>
-    </p:bg>
     <p:spTree>
       <p:nvGrpSpPr>
         <p:cNvPr id="1" name=""/>
@@ -4939,102 +5873,12 @@
           <a:chExt cx="0" cy="0"/>
         </a:xfrm>
       </p:grpSpPr>
-      <p:sp>
-        <p:nvSpPr>
-          <p:cNvPr id="2" name="Title 1">
-            <a:extLst>
-              <a:ext uri="{FF2B5EF4-FFF2-40B4-BE49-F238E27FC236}">
-                <a16:creationId xmlns:a16="http://schemas.microsoft.com/office/drawing/2014/main" id="{327E1693-2666-4D48-9CFA-C4CC365BF226}"/>
-              </a:ext>
-            </a:extLst>
-          </p:cNvPr>
-          <p:cNvSpPr>
-            <a:spLocks noGrp="1"/>
-          </p:cNvSpPr>
-          <p:nvPr>
-            <p:ph type="title"/>
-          </p:nvPr>
-        </p:nvSpPr>
-        <p:spPr>
-          <a:xfrm>
-            <a:off x="960100" y="978102"/>
-            <a:ext cx="10588434" cy="1062644"/>
-          </a:xfrm>
-        </p:spPr>
-        <p:txBody>
-          <a:bodyPr anchor="b">
-            <a:normAutofit/>
-          </a:bodyPr>
-          <a:lstStyle/>
-          <a:p>
-            <a:r>
-              <a:rPr lang="en-US" dirty="0"/>
-              <a:t>Things that I like about the tech.</a:t>
-            </a:r>
-          </a:p>
-        </p:txBody>
-      </p:sp>
-      <p:cxnSp>
-        <p:nvCxnSpPr>
-          <p:cNvPr id="12" name="Straight Connector 11">
-            <a:extLst>
-              <a:ext uri="{FF2B5EF4-FFF2-40B4-BE49-F238E27FC236}">
-                <a16:creationId xmlns:a16="http://schemas.microsoft.com/office/drawing/2014/main" id="{39B7FDC9-F0CE-43A7-9F2A-83DD09DC3453}"/>
-              </a:ext>
-              <a:ext uri="{C183D7F6-B498-43B3-948B-1728B52AA6E4}">
-                <adec:decorative xmlns:adec="http://schemas.microsoft.com/office/drawing/2017/decorative" val="1"/>
-              </a:ext>
-            </a:extLst>
-          </p:cNvPr>
-          <p:cNvCxnSpPr>
-            <a:cxnSpLocks noGrp="1" noRot="1" noChangeAspect="1" noMove="1" noResize="1" noEditPoints="1" noAdjustHandles="1" noChangeArrowheads="1" noChangeShapeType="1"/>
-          </p:cNvCxnSpPr>
-          <p:nvPr>
-            <p:extLst>
-              <p:ext uri="{386F3935-93C4-4BCD-93E2-E3B085C9AB24}">
-                <p16:designElem xmlns:p16="http://schemas.microsoft.com/office/powerpoint/2015/main" val="1"/>
-              </p:ext>
-            </p:extLst>
-          </p:nvPr>
-        </p:nvCxnSpPr>
-        <p:spPr>
-          <a:xfrm>
-            <a:off x="1047624" y="2265037"/>
-            <a:ext cx="10125012" cy="0"/>
-          </a:xfrm>
-          <a:prstGeom prst="line">
-            <a:avLst/>
-          </a:prstGeom>
-          <a:ln w="15875">
-            <a:solidFill>
-              <a:schemeClr val="tx1">
-                <a:lumMod val="65000"/>
-                <a:lumOff val="35000"/>
-              </a:schemeClr>
-            </a:solidFill>
-          </a:ln>
-        </p:spPr>
-        <p:style>
-          <a:lnRef idx="1">
-            <a:schemeClr val="accent1"/>
-          </a:lnRef>
-          <a:fillRef idx="0">
-            <a:schemeClr val="accent1"/>
-          </a:fillRef>
-          <a:effectRef idx="0">
-            <a:schemeClr val="accent1"/>
-          </a:effectRef>
-          <a:fontRef idx="minor">
-            <a:schemeClr val="tx1"/>
-          </a:fontRef>
-        </p:style>
-      </p:cxnSp>
       <p:pic>
         <p:nvPicPr>
-          <p:cNvPr id="5" name="Content Placeholder 4" descr="Angel face with solid fill">
-            <a:extLst>
-              <a:ext uri="{FF2B5EF4-FFF2-40B4-BE49-F238E27FC236}">
-                <a16:creationId xmlns:a16="http://schemas.microsoft.com/office/drawing/2014/main" id="{831A082B-9A5E-4DF2-B2E5-B3DB1B6C21F4}"/>
+          <p:cNvPr id="6" name="Graphic 5" descr="Internet">
+            <a:extLst>
+              <a:ext uri="{FF2B5EF4-FFF2-40B4-BE49-F238E27FC236}">
+                <a16:creationId xmlns:a16="http://schemas.microsoft.com/office/drawing/2014/main" id="{91533585-3968-471B-829C-0E58B82D101D}"/>
               </a:ext>
             </a:extLst>
           </p:cNvPr>
@@ -5060,8 +5904,8 @@
         </p:blipFill>
         <p:spPr>
           <a:xfrm>
-            <a:off x="1333206" y="2811104"/>
-            <a:ext cx="2928114" cy="2928114"/>
+            <a:off x="530086" y="134178"/>
+            <a:ext cx="2415209" cy="2415209"/>
           </a:xfrm>
           <a:prstGeom prst="rect">
             <a:avLst/>
@@ -5070,40 +5914,589 @@
       </p:pic>
       <p:sp>
         <p:nvSpPr>
-          <p:cNvPr id="9" name="Content Placeholder 8">
-            <a:extLst>
-              <a:ext uri="{FF2B5EF4-FFF2-40B4-BE49-F238E27FC236}">
-                <a16:creationId xmlns:a16="http://schemas.microsoft.com/office/drawing/2014/main" id="{643115F0-0C4F-4E88-9D42-E6C8EBF41A53}"/>
-              </a:ext>
-            </a:extLst>
-          </p:cNvPr>
-          <p:cNvSpPr>
-            <a:spLocks noGrp="1"/>
-          </p:cNvSpPr>
-          <p:nvPr>
-            <p:ph idx="1"/>
-          </p:nvPr>
-        </p:nvSpPr>
-        <p:spPr>
-          <a:xfrm>
-            <a:off x="4955354" y="2682433"/>
-            <a:ext cx="6282169" cy="3215749"/>
-          </a:xfrm>
-        </p:spPr>
-        <p:txBody>
-          <a:bodyPr>
-            <a:normAutofit/>
-          </a:bodyPr>
-          <a:lstStyle/>
-          <a:p>
-            <a:endParaRPr lang="en-US" sz="2400"/>
-          </a:p>
-        </p:txBody>
-      </p:sp>
+          <p:cNvPr id="9" name="Arrow: Right 8">
+            <a:extLst>
+              <a:ext uri="{FF2B5EF4-FFF2-40B4-BE49-F238E27FC236}">
+                <a16:creationId xmlns:a16="http://schemas.microsoft.com/office/drawing/2014/main" id="{EBDD0F87-97B6-471D-B9D2-50E9EC66AB8D}"/>
+              </a:ext>
+            </a:extLst>
+          </p:cNvPr>
+          <p:cNvSpPr/>
+          <p:nvPr/>
+        </p:nvSpPr>
+        <p:spPr>
+          <a:xfrm>
+            <a:off x="3667539" y="785191"/>
+            <a:ext cx="2693504" cy="298174"/>
+          </a:xfrm>
+          <a:prstGeom prst="rightArrow">
+            <a:avLst/>
+          </a:prstGeom>
+        </p:spPr>
+        <p:style>
+          <a:lnRef idx="2">
+            <a:schemeClr val="accent1">
+              <a:shade val="50000"/>
+            </a:schemeClr>
+          </a:lnRef>
+          <a:fillRef idx="1">
+            <a:schemeClr val="accent1"/>
+          </a:fillRef>
+          <a:effectRef idx="0">
+            <a:schemeClr val="accent1"/>
+          </a:effectRef>
+          <a:fontRef idx="minor">
+            <a:schemeClr val="lt1"/>
+          </a:fontRef>
+        </p:style>
+        <p:txBody>
+          <a:bodyPr rtlCol="0" anchor="ctr"/>
+          <a:lstStyle/>
+          <a:p>
+            <a:pPr algn="ctr"/>
+            <a:endParaRPr lang="en-US"/>
+          </a:p>
+        </p:txBody>
+      </p:sp>
+      <p:sp>
+        <p:nvSpPr>
+          <p:cNvPr id="11" name="Arrow: Right 10">
+            <a:extLst>
+              <a:ext uri="{FF2B5EF4-FFF2-40B4-BE49-F238E27FC236}">
+                <a16:creationId xmlns:a16="http://schemas.microsoft.com/office/drawing/2014/main" id="{D03C6FBA-15F3-4032-8734-5E20E8EBA7C8}"/>
+              </a:ext>
+            </a:extLst>
+          </p:cNvPr>
+          <p:cNvSpPr/>
+          <p:nvPr/>
+        </p:nvSpPr>
+        <p:spPr>
+          <a:xfrm rot="10800000">
+            <a:off x="3808344" y="1679712"/>
+            <a:ext cx="2693504" cy="298174"/>
+          </a:xfrm>
+          <a:prstGeom prst="rightArrow">
+            <a:avLst/>
+          </a:prstGeom>
+        </p:spPr>
+        <p:style>
+          <a:lnRef idx="2">
+            <a:schemeClr val="accent1">
+              <a:shade val="50000"/>
+            </a:schemeClr>
+          </a:lnRef>
+          <a:fillRef idx="1">
+            <a:schemeClr val="accent1"/>
+          </a:fillRef>
+          <a:effectRef idx="0">
+            <a:schemeClr val="accent1"/>
+          </a:effectRef>
+          <a:fontRef idx="minor">
+            <a:schemeClr val="lt1"/>
+          </a:fontRef>
+        </p:style>
+        <p:txBody>
+          <a:bodyPr rtlCol="0" anchor="ctr"/>
+          <a:lstStyle/>
+          <a:p>
+            <a:pPr algn="ctr"/>
+            <a:endParaRPr lang="en-US"/>
+          </a:p>
+        </p:txBody>
+      </p:sp>
+      <p:sp>
+        <p:nvSpPr>
+          <p:cNvPr id="12" name="Scroll: Vertical 11">
+            <a:extLst>
+              <a:ext uri="{FF2B5EF4-FFF2-40B4-BE49-F238E27FC236}">
+                <a16:creationId xmlns:a16="http://schemas.microsoft.com/office/drawing/2014/main" id="{2A85F721-5B76-4BF0-9FC3-008A519E16DF}"/>
+              </a:ext>
+            </a:extLst>
+          </p:cNvPr>
+          <p:cNvSpPr/>
+          <p:nvPr/>
+        </p:nvSpPr>
+        <p:spPr>
+          <a:xfrm>
+            <a:off x="6341167" y="110988"/>
+            <a:ext cx="1848678" cy="1620078"/>
+          </a:xfrm>
+          <a:prstGeom prst="verticalScroll">
+            <a:avLst/>
+          </a:prstGeom>
+        </p:spPr>
+        <p:style>
+          <a:lnRef idx="2">
+            <a:schemeClr val="accent4">
+              <a:shade val="50000"/>
+            </a:schemeClr>
+          </a:lnRef>
+          <a:fillRef idx="1">
+            <a:schemeClr val="accent4"/>
+          </a:fillRef>
+          <a:effectRef idx="0">
+            <a:schemeClr val="accent4"/>
+          </a:effectRef>
+          <a:fontRef idx="minor">
+            <a:schemeClr val="lt1"/>
+          </a:fontRef>
+        </p:style>
+        <p:txBody>
+          <a:bodyPr rtlCol="0" anchor="ctr"/>
+          <a:lstStyle/>
+          <a:p>
+            <a:pPr algn="ctr"/>
+            <a:r>
+              <a:rPr lang="en-US" dirty="0"/>
+              <a:t>html</a:t>
+            </a:r>
+          </a:p>
+        </p:txBody>
+      </p:sp>
+      <p:sp>
+        <p:nvSpPr>
+          <p:cNvPr id="15" name="Rectangle: Rounded Corners 14">
+            <a:extLst>
+              <a:ext uri="{FF2B5EF4-FFF2-40B4-BE49-F238E27FC236}">
+                <a16:creationId xmlns:a16="http://schemas.microsoft.com/office/drawing/2014/main" id="{7E155F02-DC02-4FD4-86CC-797CCD03B390}"/>
+              </a:ext>
+            </a:extLst>
+          </p:cNvPr>
+          <p:cNvSpPr/>
+          <p:nvPr/>
+        </p:nvSpPr>
+        <p:spPr>
+          <a:xfrm>
+            <a:off x="7924799" y="616226"/>
+            <a:ext cx="3170583" cy="1709531"/>
+          </a:xfrm>
+          <a:prstGeom prst="roundRect">
+            <a:avLst/>
+          </a:prstGeom>
+        </p:spPr>
+        <p:style>
+          <a:lnRef idx="2">
+            <a:schemeClr val="accent3">
+              <a:shade val="50000"/>
+            </a:schemeClr>
+          </a:lnRef>
+          <a:fillRef idx="1">
+            <a:schemeClr val="accent3"/>
+          </a:fillRef>
+          <a:effectRef idx="0">
+            <a:schemeClr val="accent3"/>
+          </a:effectRef>
+          <a:fontRef idx="minor">
+            <a:schemeClr val="lt1"/>
+          </a:fontRef>
+        </p:style>
+        <p:txBody>
+          <a:bodyPr rtlCol="0" anchor="ctr"/>
+          <a:lstStyle/>
+          <a:p>
+            <a:pPr algn="ctr"/>
+            <a:r>
+              <a:rPr lang="en-US" dirty="0"/>
+              <a:t>Presentation Layer/ client side/ </a:t>
+            </a:r>
+            <a:r>
+              <a:rPr lang="en-US" dirty="0" err="1"/>
+              <a:t>ui</a:t>
+            </a:r>
+            <a:r>
+              <a:rPr lang="en-US" dirty="0"/>
+              <a:t>/</a:t>
+            </a:r>
+            <a:r>
+              <a:rPr lang="en-US" dirty="0" err="1"/>
+              <a:t>ux</a:t>
+            </a:r>
+            <a:endParaRPr lang="en-US" dirty="0"/>
+          </a:p>
+        </p:txBody>
+      </p:sp>
+      <p:sp>
+        <p:nvSpPr>
+          <p:cNvPr id="17" name="Rectangle: Rounded Corners 16">
+            <a:extLst>
+              <a:ext uri="{FF2B5EF4-FFF2-40B4-BE49-F238E27FC236}">
+                <a16:creationId xmlns:a16="http://schemas.microsoft.com/office/drawing/2014/main" id="{A7ABBA3A-6586-41BE-B908-A9079C5E00BC}"/>
+              </a:ext>
+            </a:extLst>
+          </p:cNvPr>
+          <p:cNvSpPr/>
+          <p:nvPr/>
+        </p:nvSpPr>
+        <p:spPr>
+          <a:xfrm>
+            <a:off x="7924800" y="2796209"/>
+            <a:ext cx="3170583" cy="1709531"/>
+          </a:xfrm>
+          <a:prstGeom prst="roundRect">
+            <a:avLst/>
+          </a:prstGeom>
+        </p:spPr>
+        <p:style>
+          <a:lnRef idx="2">
+            <a:schemeClr val="accent6">
+              <a:shade val="50000"/>
+            </a:schemeClr>
+          </a:lnRef>
+          <a:fillRef idx="1">
+            <a:schemeClr val="accent6"/>
+          </a:fillRef>
+          <a:effectRef idx="0">
+            <a:schemeClr val="accent6"/>
+          </a:effectRef>
+          <a:fontRef idx="minor">
+            <a:schemeClr val="lt1"/>
+          </a:fontRef>
+        </p:style>
+        <p:txBody>
+          <a:bodyPr rtlCol="0" anchor="ctr"/>
+          <a:lstStyle/>
+          <a:p>
+            <a:pPr algn="ctr"/>
+            <a:r>
+              <a:rPr lang="en-US" dirty="0"/>
+              <a:t>Data access Layer/ service/ business logic</a:t>
+            </a:r>
+          </a:p>
+        </p:txBody>
+      </p:sp>
+      <p:sp>
+        <p:nvSpPr>
+          <p:cNvPr id="19" name="Rectangle: Rounded Corners 18">
+            <a:extLst>
+              <a:ext uri="{FF2B5EF4-FFF2-40B4-BE49-F238E27FC236}">
+                <a16:creationId xmlns:a16="http://schemas.microsoft.com/office/drawing/2014/main" id="{B06C6834-4901-4430-B09A-4A8460C15A2E}"/>
+              </a:ext>
+            </a:extLst>
+          </p:cNvPr>
+          <p:cNvSpPr/>
+          <p:nvPr/>
+        </p:nvSpPr>
+        <p:spPr>
+          <a:xfrm>
+            <a:off x="7924800" y="4817166"/>
+            <a:ext cx="3170583" cy="1709531"/>
+          </a:xfrm>
+          <a:prstGeom prst="roundRect">
+            <a:avLst/>
+          </a:prstGeom>
+        </p:spPr>
+        <p:style>
+          <a:lnRef idx="2">
+            <a:schemeClr val="accent4">
+              <a:shade val="50000"/>
+            </a:schemeClr>
+          </a:lnRef>
+          <a:fillRef idx="1">
+            <a:schemeClr val="accent4"/>
+          </a:fillRef>
+          <a:effectRef idx="0">
+            <a:schemeClr val="accent4"/>
+          </a:effectRef>
+          <a:fontRef idx="minor">
+            <a:schemeClr val="lt1"/>
+          </a:fontRef>
+        </p:style>
+        <p:txBody>
+          <a:bodyPr rtlCol="0" anchor="ctr"/>
+          <a:lstStyle/>
+          <a:p>
+            <a:pPr algn="ctr"/>
+            <a:r>
+              <a:rPr lang="en-US" dirty="0"/>
+              <a:t>Data </a:t>
+            </a:r>
+            <a:r>
+              <a:rPr lang="en-US" dirty="0" err="1"/>
+              <a:t>BaseLayer</a:t>
+            </a:r>
+            <a:endParaRPr lang="en-US" dirty="0"/>
+          </a:p>
+        </p:txBody>
+      </p:sp>
+      <p:sp>
+        <p:nvSpPr>
+          <p:cNvPr id="21" name="Arrow: Right 20">
+            <a:extLst>
+              <a:ext uri="{FF2B5EF4-FFF2-40B4-BE49-F238E27FC236}">
+                <a16:creationId xmlns:a16="http://schemas.microsoft.com/office/drawing/2014/main" id="{F248D2BA-4632-4215-BC5D-6B37D43CFA8E}"/>
+              </a:ext>
+            </a:extLst>
+          </p:cNvPr>
+          <p:cNvSpPr/>
+          <p:nvPr/>
+        </p:nvSpPr>
+        <p:spPr>
+          <a:xfrm rot="5400000">
+            <a:off x="10031896" y="2430946"/>
+            <a:ext cx="369402" cy="236882"/>
+          </a:xfrm>
+          <a:prstGeom prst="rightArrow">
+            <a:avLst/>
+          </a:prstGeom>
+        </p:spPr>
+        <p:style>
+          <a:lnRef idx="2">
+            <a:schemeClr val="accent1">
+              <a:shade val="50000"/>
+            </a:schemeClr>
+          </a:lnRef>
+          <a:fillRef idx="1">
+            <a:schemeClr val="accent1"/>
+          </a:fillRef>
+          <a:effectRef idx="0">
+            <a:schemeClr val="accent1"/>
+          </a:effectRef>
+          <a:fontRef idx="minor">
+            <a:schemeClr val="lt1"/>
+          </a:fontRef>
+        </p:style>
+        <p:txBody>
+          <a:bodyPr rtlCol="0" anchor="ctr"/>
+          <a:lstStyle/>
+          <a:p>
+            <a:pPr algn="ctr"/>
+            <a:endParaRPr lang="en-US"/>
+          </a:p>
+        </p:txBody>
+      </p:sp>
+      <p:sp>
+        <p:nvSpPr>
+          <p:cNvPr id="23" name="Arrow: Right 22">
+            <a:extLst>
+              <a:ext uri="{FF2B5EF4-FFF2-40B4-BE49-F238E27FC236}">
+                <a16:creationId xmlns:a16="http://schemas.microsoft.com/office/drawing/2014/main" id="{2E1A4693-B1BF-40CA-B63D-D8FD9605C560}"/>
+              </a:ext>
+            </a:extLst>
+          </p:cNvPr>
+          <p:cNvSpPr/>
+          <p:nvPr/>
+        </p:nvSpPr>
+        <p:spPr>
+          <a:xfrm rot="5400000">
+            <a:off x="10031896" y="4572000"/>
+            <a:ext cx="369402" cy="236882"/>
+          </a:xfrm>
+          <a:prstGeom prst="rightArrow">
+            <a:avLst/>
+          </a:prstGeom>
+        </p:spPr>
+        <p:style>
+          <a:lnRef idx="2">
+            <a:schemeClr val="accent1">
+              <a:shade val="50000"/>
+            </a:schemeClr>
+          </a:lnRef>
+          <a:fillRef idx="1">
+            <a:schemeClr val="accent1"/>
+          </a:fillRef>
+          <a:effectRef idx="0">
+            <a:schemeClr val="accent1"/>
+          </a:effectRef>
+          <a:fontRef idx="minor">
+            <a:schemeClr val="lt1"/>
+          </a:fontRef>
+        </p:style>
+        <p:txBody>
+          <a:bodyPr rtlCol="0" anchor="ctr"/>
+          <a:lstStyle/>
+          <a:p>
+            <a:pPr algn="ctr"/>
+            <a:endParaRPr lang="en-US"/>
+          </a:p>
+        </p:txBody>
+      </p:sp>
+      <p:sp>
+        <p:nvSpPr>
+          <p:cNvPr id="25" name="Arrow: Right 24">
+            <a:extLst>
+              <a:ext uri="{FF2B5EF4-FFF2-40B4-BE49-F238E27FC236}">
+                <a16:creationId xmlns:a16="http://schemas.microsoft.com/office/drawing/2014/main" id="{BDAEE252-194A-4670-BB61-9F9F00770677}"/>
+              </a:ext>
+            </a:extLst>
+          </p:cNvPr>
+          <p:cNvSpPr/>
+          <p:nvPr/>
+        </p:nvSpPr>
+        <p:spPr>
+          <a:xfrm rot="16200000">
+            <a:off x="9034669" y="4543012"/>
+            <a:ext cx="369402" cy="236882"/>
+          </a:xfrm>
+          <a:prstGeom prst="rightArrow">
+            <a:avLst/>
+          </a:prstGeom>
+        </p:spPr>
+        <p:style>
+          <a:lnRef idx="2">
+            <a:schemeClr val="accent1">
+              <a:shade val="50000"/>
+            </a:schemeClr>
+          </a:lnRef>
+          <a:fillRef idx="1">
+            <a:schemeClr val="accent1"/>
+          </a:fillRef>
+          <a:effectRef idx="0">
+            <a:schemeClr val="accent1"/>
+          </a:effectRef>
+          <a:fontRef idx="minor">
+            <a:schemeClr val="lt1"/>
+          </a:fontRef>
+        </p:style>
+        <p:txBody>
+          <a:bodyPr rtlCol="0" anchor="ctr"/>
+          <a:lstStyle/>
+          <a:p>
+            <a:pPr algn="ctr"/>
+            <a:endParaRPr lang="en-US"/>
+          </a:p>
+        </p:txBody>
+      </p:sp>
+      <p:sp>
+        <p:nvSpPr>
+          <p:cNvPr id="27" name="Arrow: Right 26">
+            <a:extLst>
+              <a:ext uri="{FF2B5EF4-FFF2-40B4-BE49-F238E27FC236}">
+                <a16:creationId xmlns:a16="http://schemas.microsoft.com/office/drawing/2014/main" id="{581EF9D2-191F-476F-A2B9-1B00CEC13EC7}"/>
+              </a:ext>
+            </a:extLst>
+          </p:cNvPr>
+          <p:cNvSpPr/>
+          <p:nvPr/>
+        </p:nvSpPr>
+        <p:spPr>
+          <a:xfrm rot="16200000">
+            <a:off x="8989941" y="2430946"/>
+            <a:ext cx="369402" cy="236882"/>
+          </a:xfrm>
+          <a:prstGeom prst="rightArrow">
+            <a:avLst/>
+          </a:prstGeom>
+        </p:spPr>
+        <p:style>
+          <a:lnRef idx="2">
+            <a:schemeClr val="accent1">
+              <a:shade val="50000"/>
+            </a:schemeClr>
+          </a:lnRef>
+          <a:fillRef idx="1">
+            <a:schemeClr val="accent1"/>
+          </a:fillRef>
+          <a:effectRef idx="0">
+            <a:schemeClr val="accent1"/>
+          </a:effectRef>
+          <a:fontRef idx="minor">
+            <a:schemeClr val="lt1"/>
+          </a:fontRef>
+        </p:style>
+        <p:txBody>
+          <a:bodyPr rtlCol="0" anchor="ctr"/>
+          <a:lstStyle/>
+          <a:p>
+            <a:pPr algn="ctr"/>
+            <a:endParaRPr lang="en-US"/>
+          </a:p>
+        </p:txBody>
+      </p:sp>
+      <p:sp>
+        <p:nvSpPr>
+          <p:cNvPr id="29" name="Scroll: Vertical 28">
+            <a:extLst>
+              <a:ext uri="{FF2B5EF4-FFF2-40B4-BE49-F238E27FC236}">
+                <a16:creationId xmlns:a16="http://schemas.microsoft.com/office/drawing/2014/main" id="{5E7BCDC1-4C5E-4AA1-B9B4-7564C4630385}"/>
+              </a:ext>
+            </a:extLst>
+          </p:cNvPr>
+          <p:cNvSpPr/>
+          <p:nvPr/>
+        </p:nvSpPr>
+        <p:spPr>
+          <a:xfrm>
+            <a:off x="2030896" y="3650974"/>
+            <a:ext cx="1848678" cy="1620078"/>
+          </a:xfrm>
+          <a:prstGeom prst="verticalScroll">
+            <a:avLst/>
+          </a:prstGeom>
+          <a:solidFill>
+            <a:srgbClr val="7030A0"/>
+          </a:solidFill>
+        </p:spPr>
+        <p:style>
+          <a:lnRef idx="2">
+            <a:schemeClr val="accent4">
+              <a:shade val="50000"/>
+            </a:schemeClr>
+          </a:lnRef>
+          <a:fillRef idx="1">
+            <a:schemeClr val="accent4"/>
+          </a:fillRef>
+          <a:effectRef idx="0">
+            <a:schemeClr val="accent4"/>
+          </a:effectRef>
+          <a:fontRef idx="minor">
+            <a:schemeClr val="lt1"/>
+          </a:fontRef>
+        </p:style>
+        <p:txBody>
+          <a:bodyPr rtlCol="0" anchor="ctr"/>
+          <a:lstStyle/>
+          <a:p>
+            <a:pPr algn="ctr"/>
+            <a:r>
+              <a:rPr lang="en-US" dirty="0"/>
+              <a:t>Bootstrap</a:t>
+            </a:r>
+          </a:p>
+        </p:txBody>
+      </p:sp>
+      <p:pic>
+        <p:nvPicPr>
+          <p:cNvPr id="33" name="Graphic 32" descr="Server">
+            <a:extLst>
+              <a:ext uri="{FF2B5EF4-FFF2-40B4-BE49-F238E27FC236}">
+                <a16:creationId xmlns:a16="http://schemas.microsoft.com/office/drawing/2014/main" id="{116E1EA5-786C-438A-8ED7-46DF858F7CA3}"/>
+              </a:ext>
+            </a:extLst>
+          </p:cNvPr>
+          <p:cNvPicPr>
+            <a:picLocks noChangeAspect="1"/>
+          </p:cNvPicPr>
+          <p:nvPr/>
+        </p:nvPicPr>
+        <p:blipFill>
+          <a:blip r:embed="rId4">
+            <a:extLst>
+              <a:ext uri="{28A0092B-C50C-407E-A947-70E740481C1C}">
+                <a14:useLocalDpi xmlns:a14="http://schemas.microsoft.com/office/drawing/2010/main" val="0"/>
+              </a:ext>
+              <a:ext uri="{96DAC541-7B7A-43D3-8B79-37D633B846F1}">
+                <asvg:svgBlip xmlns:asvg="http://schemas.microsoft.com/office/drawing/2016/SVG/main" r:embed="rId5"/>
+              </a:ext>
+            </a:extLst>
+          </a:blip>
+          <a:stretch>
+            <a:fillRect/>
+          </a:stretch>
+        </p:blipFill>
+        <p:spPr>
+          <a:xfrm>
+            <a:off x="1096617" y="4476752"/>
+            <a:ext cx="1858618" cy="1858618"/>
+          </a:xfrm>
+          <a:prstGeom prst="rect">
+            <a:avLst/>
+          </a:prstGeom>
+        </p:spPr>
+      </p:pic>
     </p:spTree>
     <p:extLst>
       <p:ext uri="{BB962C8B-B14F-4D97-AF65-F5344CB8AC3E}">
-        <p14:creationId xmlns:p14="http://schemas.microsoft.com/office/powerpoint/2010/main" val="275338840"/>
+        <p14:creationId xmlns:p14="http://schemas.microsoft.com/office/powerpoint/2010/main" val="1242755065"/>
       </p:ext>
     </p:extLst>
   </p:cSld>
@@ -5116,14 +6509,6 @@
 <file path=ppt/slides/slide8.xml><?xml version="1.0" encoding="utf-8"?>
 <p:sld xmlns:a="http://schemas.openxmlformats.org/drawingml/2006/main" xmlns:r="http://schemas.openxmlformats.org/officeDocument/2006/relationships" xmlns:p="http://schemas.openxmlformats.org/presentationml/2006/main">
   <p:cSld>
-    <p:bg>
-      <p:bgPr>
-        <a:solidFill>
-          <a:schemeClr val="bg1"/>
-        </a:solidFill>
-        <a:effectLst/>
-      </p:bgPr>
-    </p:bg>
     <p:spTree>
       <p:nvGrpSpPr>
         <p:cNvPr id="1" name=""/>
@@ -5143,7 +6528,7 @@
           <p:cNvPr id="2" name="Title 1">
             <a:extLst>
               <a:ext uri="{FF2B5EF4-FFF2-40B4-BE49-F238E27FC236}">
-                <a16:creationId xmlns:a16="http://schemas.microsoft.com/office/drawing/2014/main" id="{0CC0E406-D236-41FD-BF23-D5B48575375E}"/>
+                <a16:creationId xmlns:a16="http://schemas.microsoft.com/office/drawing/2014/main" id="{8CFC1DAF-E337-417B-BBE0-B5B4694BAB6D}"/>
               </a:ext>
             </a:extLst>
           </p:cNvPr>
@@ -5154,86 +6539,297 @@
             <p:ph type="title"/>
           </p:nvPr>
         </p:nvSpPr>
-        <p:spPr>
-          <a:xfrm>
-            <a:off x="960100" y="978102"/>
-            <a:ext cx="10588434" cy="1062644"/>
-          </a:xfrm>
-        </p:spPr>
-        <p:txBody>
-          <a:bodyPr anchor="b">
-            <a:normAutofit/>
-          </a:bodyPr>
+        <p:spPr/>
+        <p:txBody>
+          <a:bodyPr/>
           <a:lstStyle/>
           <a:p>
             <a:r>
               <a:rPr lang="en-US" dirty="0"/>
-              <a:t>Things that frustrate me</a:t>
-            </a:r>
-          </a:p>
-        </p:txBody>
-      </p:sp>
-      <p:cxnSp>
-        <p:nvCxnSpPr>
-          <p:cNvPr id="12" name="Straight Connector 11">
-            <a:extLst>
-              <a:ext uri="{FF2B5EF4-FFF2-40B4-BE49-F238E27FC236}">
-                <a16:creationId xmlns:a16="http://schemas.microsoft.com/office/drawing/2014/main" id="{39B7FDC9-F0CE-43A7-9F2A-83DD09DC3453}"/>
-              </a:ext>
-              <a:ext uri="{C183D7F6-B498-43B3-948B-1728B52AA6E4}">
-                <adec:decorative xmlns:adec="http://schemas.microsoft.com/office/drawing/2017/decorative" val="1"/>
-              </a:ext>
-            </a:extLst>
-          </p:cNvPr>
-          <p:cNvCxnSpPr>
-            <a:cxnSpLocks noGrp="1" noRot="1" noChangeAspect="1" noMove="1" noResize="1" noEditPoints="1" noAdjustHandles="1" noChangeArrowheads="1" noChangeShapeType="1"/>
-          </p:cNvCxnSpPr>
-          <p:nvPr>
-            <p:extLst>
-              <p:ext uri="{386F3935-93C4-4BCD-93E2-E3B085C9AB24}">
-                <p16:designElem xmlns:p16="http://schemas.microsoft.com/office/powerpoint/2015/main" val="1"/>
-              </p:ext>
-            </p:extLst>
-          </p:nvPr>
-        </p:nvCxnSpPr>
-        <p:spPr>
-          <a:xfrm>
-            <a:off x="1047624" y="2265037"/>
-            <a:ext cx="10125012" cy="0"/>
-          </a:xfrm>
-          <a:prstGeom prst="line">
+              <a:t>App design</a:t>
+            </a:r>
+          </a:p>
+        </p:txBody>
+      </p:sp>
+      <p:sp>
+        <p:nvSpPr>
+          <p:cNvPr id="4" name="Rectangle 3">
+            <a:extLst>
+              <a:ext uri="{FF2B5EF4-FFF2-40B4-BE49-F238E27FC236}">
+                <a16:creationId xmlns:a16="http://schemas.microsoft.com/office/drawing/2014/main" id="{D16596D6-163D-41D7-A932-F7985E5E3B7D}"/>
+              </a:ext>
+            </a:extLst>
+          </p:cNvPr>
+          <p:cNvSpPr/>
+          <p:nvPr/>
+        </p:nvSpPr>
+        <p:spPr>
+          <a:xfrm>
+            <a:off x="2315817" y="2345635"/>
+            <a:ext cx="1789044" cy="2315817"/>
+          </a:xfrm>
+          <a:prstGeom prst="rect">
             <a:avLst/>
           </a:prstGeom>
-          <a:ln w="15875">
-            <a:solidFill>
-              <a:schemeClr val="tx1">
-                <a:lumMod val="65000"/>
-                <a:lumOff val="35000"/>
-              </a:schemeClr>
-            </a:solidFill>
-          </a:ln>
         </p:spPr>
         <p:style>
-          <a:lnRef idx="1">
-            <a:schemeClr val="accent1"/>
+          <a:lnRef idx="2">
+            <a:schemeClr val="accent1">
+              <a:shade val="50000"/>
+            </a:schemeClr>
           </a:lnRef>
-          <a:fillRef idx="0">
+          <a:fillRef idx="1">
             <a:schemeClr val="accent1"/>
           </a:fillRef>
           <a:effectRef idx="0">
             <a:schemeClr val="accent1"/>
           </a:effectRef>
           <a:fontRef idx="minor">
-            <a:schemeClr val="tx1"/>
+            <a:schemeClr val="lt1"/>
           </a:fontRef>
         </p:style>
-      </p:cxnSp>
+        <p:txBody>
+          <a:bodyPr rtlCol="0" anchor="ctr"/>
+          <a:lstStyle/>
+          <a:p>
+            <a:pPr algn="ctr"/>
+            <a:r>
+              <a:rPr lang="en-US" dirty="0"/>
+              <a:t>Home</a:t>
+            </a:r>
+          </a:p>
+        </p:txBody>
+      </p:sp>
+      <p:sp>
+        <p:nvSpPr>
+          <p:cNvPr id="6" name="Rectangle 5">
+            <a:extLst>
+              <a:ext uri="{FF2B5EF4-FFF2-40B4-BE49-F238E27FC236}">
+                <a16:creationId xmlns:a16="http://schemas.microsoft.com/office/drawing/2014/main" id="{A93CA2F8-E395-4B8E-B910-B18A85AE5DC3}"/>
+              </a:ext>
+            </a:extLst>
+          </p:cNvPr>
+          <p:cNvSpPr/>
+          <p:nvPr/>
+        </p:nvSpPr>
+        <p:spPr>
+          <a:xfrm>
+            <a:off x="6096000" y="2345634"/>
+            <a:ext cx="1789044" cy="2315817"/>
+          </a:xfrm>
+          <a:prstGeom prst="rect">
+            <a:avLst/>
+          </a:prstGeom>
+        </p:spPr>
+        <p:style>
+          <a:lnRef idx="2">
+            <a:schemeClr val="accent1">
+              <a:shade val="50000"/>
+            </a:schemeClr>
+          </a:lnRef>
+          <a:fillRef idx="1">
+            <a:schemeClr val="accent1"/>
+          </a:fillRef>
+          <a:effectRef idx="0">
+            <a:schemeClr val="accent1"/>
+          </a:effectRef>
+          <a:fontRef idx="minor">
+            <a:schemeClr val="lt1"/>
+          </a:fontRef>
+        </p:style>
+        <p:txBody>
+          <a:bodyPr rtlCol="0" anchor="ctr"/>
+          <a:lstStyle/>
+          <a:p>
+            <a:pPr algn="ctr"/>
+            <a:r>
+              <a:rPr lang="en-US" dirty="0" err="1"/>
+              <a:t>Pokedex</a:t>
+            </a:r>
+            <a:endParaRPr lang="en-US" dirty="0"/>
+          </a:p>
+        </p:txBody>
+      </p:sp>
+      <p:sp>
+        <p:nvSpPr>
+          <p:cNvPr id="7" name="Arrow: Left-Right 6">
+            <a:extLst>
+              <a:ext uri="{FF2B5EF4-FFF2-40B4-BE49-F238E27FC236}">
+                <a16:creationId xmlns:a16="http://schemas.microsoft.com/office/drawing/2014/main" id="{62ACE5E3-1244-454B-872E-2F5B3AC06E78}"/>
+              </a:ext>
+            </a:extLst>
+          </p:cNvPr>
+          <p:cNvSpPr/>
+          <p:nvPr/>
+        </p:nvSpPr>
+        <p:spPr>
+          <a:xfrm>
+            <a:off x="4373217" y="3170583"/>
+            <a:ext cx="1461053" cy="447260"/>
+          </a:xfrm>
+          <a:prstGeom prst="leftRightArrow">
+            <a:avLst/>
+          </a:prstGeom>
+        </p:spPr>
+        <p:style>
+          <a:lnRef idx="2">
+            <a:schemeClr val="accent1">
+              <a:shade val="50000"/>
+            </a:schemeClr>
+          </a:lnRef>
+          <a:fillRef idx="1">
+            <a:schemeClr val="accent1"/>
+          </a:fillRef>
+          <a:effectRef idx="0">
+            <a:schemeClr val="accent1"/>
+          </a:effectRef>
+          <a:fontRef idx="minor">
+            <a:schemeClr val="lt1"/>
+          </a:fontRef>
+        </p:style>
+        <p:txBody>
+          <a:bodyPr rtlCol="0" anchor="ctr"/>
+          <a:lstStyle/>
+          <a:p>
+            <a:pPr algn="ctr"/>
+            <a:endParaRPr lang="en-US"/>
+          </a:p>
+        </p:txBody>
+      </p:sp>
+    </p:spTree>
+    <p:extLst>
+      <p:ext uri="{BB962C8B-B14F-4D97-AF65-F5344CB8AC3E}">
+        <p14:creationId xmlns:p14="http://schemas.microsoft.com/office/powerpoint/2010/main" val="30743682"/>
+      </p:ext>
+    </p:extLst>
+  </p:cSld>
+  <p:clrMapOvr>
+    <a:masterClrMapping/>
+  </p:clrMapOvr>
+</p:sld>
+</file>
+
+<file path=ppt/slides/slide9.xml><?xml version="1.0" encoding="utf-8"?>
+<p:sld xmlns:a="http://schemas.openxmlformats.org/drawingml/2006/main" xmlns:r="http://schemas.openxmlformats.org/officeDocument/2006/relationships" xmlns:p="http://schemas.openxmlformats.org/presentationml/2006/main">
+  <p:cSld>
+    <p:spTree>
+      <p:nvGrpSpPr>
+        <p:cNvPr id="1" name=""/>
+        <p:cNvGrpSpPr/>
+        <p:nvPr/>
+      </p:nvGrpSpPr>
+      <p:grpSpPr>
+        <a:xfrm>
+          <a:off x="0" y="0"/>
+          <a:ext cx="0" cy="0"/>
+          <a:chOff x="0" y="0"/>
+          <a:chExt cx="0" cy="0"/>
+        </a:xfrm>
+      </p:grpSpPr>
+      <p:sp>
+        <p:nvSpPr>
+          <p:cNvPr id="4" name="Oval 3">
+            <a:extLst>
+              <a:ext uri="{FF2B5EF4-FFF2-40B4-BE49-F238E27FC236}">
+                <a16:creationId xmlns:a16="http://schemas.microsoft.com/office/drawing/2014/main" id="{AF6DC957-783F-40D0-9479-3826D057D1C7}"/>
+              </a:ext>
+            </a:extLst>
+          </p:cNvPr>
+          <p:cNvSpPr/>
+          <p:nvPr/>
+        </p:nvSpPr>
+        <p:spPr>
+          <a:xfrm>
+            <a:off x="1093304" y="1282148"/>
+            <a:ext cx="2146853" cy="1540565"/>
+          </a:xfrm>
+          <a:prstGeom prst="ellipse">
+            <a:avLst/>
+          </a:prstGeom>
+        </p:spPr>
+        <p:style>
+          <a:lnRef idx="2">
+            <a:schemeClr val="accent1">
+              <a:shade val="50000"/>
+            </a:schemeClr>
+          </a:lnRef>
+          <a:fillRef idx="1">
+            <a:schemeClr val="accent1"/>
+          </a:fillRef>
+          <a:effectRef idx="0">
+            <a:schemeClr val="accent1"/>
+          </a:effectRef>
+          <a:fontRef idx="minor">
+            <a:schemeClr val="lt1"/>
+          </a:fontRef>
+        </p:style>
+        <p:txBody>
+          <a:bodyPr rtlCol="0" anchor="ctr"/>
+          <a:lstStyle/>
+          <a:p>
+            <a:pPr algn="ctr"/>
+            <a:r>
+              <a:rPr lang="en-US" dirty="0"/>
+              <a:t>Local repository</a:t>
+            </a:r>
+          </a:p>
+        </p:txBody>
+      </p:sp>
+      <p:sp>
+        <p:nvSpPr>
+          <p:cNvPr id="6" name="Oval 5">
+            <a:extLst>
+              <a:ext uri="{FF2B5EF4-FFF2-40B4-BE49-F238E27FC236}">
+                <a16:creationId xmlns:a16="http://schemas.microsoft.com/office/drawing/2014/main" id="{519D5F60-2C6F-4D66-95A1-97F1778DC420}"/>
+              </a:ext>
+            </a:extLst>
+          </p:cNvPr>
+          <p:cNvSpPr/>
+          <p:nvPr/>
+        </p:nvSpPr>
+        <p:spPr>
+          <a:xfrm>
+            <a:off x="8272669" y="1282148"/>
+            <a:ext cx="2146853" cy="1540565"/>
+          </a:xfrm>
+          <a:prstGeom prst="ellipse">
+            <a:avLst/>
+          </a:prstGeom>
+        </p:spPr>
+        <p:style>
+          <a:lnRef idx="2">
+            <a:schemeClr val="accent1">
+              <a:shade val="50000"/>
+            </a:schemeClr>
+          </a:lnRef>
+          <a:fillRef idx="1">
+            <a:schemeClr val="accent1"/>
+          </a:fillRef>
+          <a:effectRef idx="0">
+            <a:schemeClr val="accent1"/>
+          </a:effectRef>
+          <a:fontRef idx="minor">
+            <a:schemeClr val="lt1"/>
+          </a:fontRef>
+        </p:style>
+        <p:txBody>
+          <a:bodyPr rtlCol="0" anchor="ctr"/>
+          <a:lstStyle/>
+          <a:p>
+            <a:pPr algn="ctr"/>
+            <a:r>
+              <a:rPr lang="en-US" dirty="0"/>
+              <a:t>remote repository</a:t>
+            </a:r>
+          </a:p>
+        </p:txBody>
+      </p:sp>
       <p:pic>
         <p:nvPicPr>
-          <p:cNvPr id="5" name="Content Placeholder 4" descr="Angry face with solid fill">
-            <a:extLst>
-              <a:ext uri="{FF2B5EF4-FFF2-40B4-BE49-F238E27FC236}">
-                <a16:creationId xmlns:a16="http://schemas.microsoft.com/office/drawing/2014/main" id="{2EB60041-0F09-4973-8194-7C666875443C}"/>
+          <p:cNvPr id="8" name="Graphic 7" descr="Internet">
+            <a:extLst>
+              <a:ext uri="{FF2B5EF4-FFF2-40B4-BE49-F238E27FC236}">
+                <a16:creationId xmlns:a16="http://schemas.microsoft.com/office/drawing/2014/main" id="{585F4ECA-762A-4EC7-86D2-6976BE6E5F6E}"/>
               </a:ext>
             </a:extLst>
           </p:cNvPr>
@@ -5259,45 +6855,329 @@
         </p:blipFill>
         <p:spPr>
           <a:xfrm>
-            <a:off x="1333206" y="2811104"/>
-            <a:ext cx="2928114" cy="2928114"/>
+            <a:off x="1123121" y="2915480"/>
+            <a:ext cx="1775791" cy="1775791"/>
           </a:xfrm>
           <a:prstGeom prst="rect">
             <a:avLst/>
           </a:prstGeom>
         </p:spPr>
       </p:pic>
-      <p:sp>
-        <p:nvSpPr>
-          <p:cNvPr id="9" name="Content Placeholder 8">
-            <a:extLst>
-              <a:ext uri="{FF2B5EF4-FFF2-40B4-BE49-F238E27FC236}">
-                <a16:creationId xmlns:a16="http://schemas.microsoft.com/office/drawing/2014/main" id="{51A97855-A477-4D14-B59D-B034082F63BD}"/>
-              </a:ext>
-            </a:extLst>
-          </p:cNvPr>
-          <p:cNvSpPr>
-            <a:spLocks noGrp="1"/>
-          </p:cNvSpPr>
-          <p:nvPr>
-            <p:ph idx="1"/>
-          </p:nvPr>
-        </p:nvSpPr>
-        <p:spPr>
-          <a:xfrm>
-            <a:off x="4955354" y="2682433"/>
-            <a:ext cx="6282169" cy="3215749"/>
-          </a:xfrm>
-        </p:spPr>
-        <p:txBody>
-          <a:bodyPr>
-            <a:normAutofit/>
+      <p:pic>
+        <p:nvPicPr>
+          <p:cNvPr id="10" name="Graphic 9" descr="Server">
+            <a:extLst>
+              <a:ext uri="{FF2B5EF4-FFF2-40B4-BE49-F238E27FC236}">
+                <a16:creationId xmlns:a16="http://schemas.microsoft.com/office/drawing/2014/main" id="{66F405ED-4EEA-4BD9-95AE-4FD7A402983A}"/>
+              </a:ext>
+            </a:extLst>
+          </p:cNvPr>
+          <p:cNvPicPr>
+            <a:picLocks noChangeAspect="1"/>
+          </p:cNvPicPr>
+          <p:nvPr/>
+        </p:nvPicPr>
+        <p:blipFill>
+          <a:blip r:embed="rId4">
+            <a:extLst>
+              <a:ext uri="{28A0092B-C50C-407E-A947-70E740481C1C}">
+                <a14:useLocalDpi xmlns:a14="http://schemas.microsoft.com/office/drawing/2010/main" val="0"/>
+              </a:ext>
+              <a:ext uri="{96DAC541-7B7A-43D3-8B79-37D633B846F1}">
+                <asvg:svgBlip xmlns:asvg="http://schemas.microsoft.com/office/drawing/2016/SVG/main" r:embed="rId5"/>
+              </a:ext>
+            </a:extLst>
+          </a:blip>
+          <a:stretch>
+            <a:fillRect/>
+          </a:stretch>
+        </p:blipFill>
+        <p:spPr>
+          <a:xfrm>
+            <a:off x="8272669" y="2822713"/>
+            <a:ext cx="1858618" cy="1858618"/>
+          </a:xfrm>
+          <a:prstGeom prst="rect">
+            <a:avLst/>
+          </a:prstGeom>
+        </p:spPr>
+      </p:pic>
+      <p:sp>
+        <p:nvSpPr>
+          <p:cNvPr id="11" name="Rectangle 10">
+            <a:extLst>
+              <a:ext uri="{FF2B5EF4-FFF2-40B4-BE49-F238E27FC236}">
+                <a16:creationId xmlns:a16="http://schemas.microsoft.com/office/drawing/2014/main" id="{6099FD0A-0E67-4ACF-A63C-25F43C4192B7}"/>
+              </a:ext>
+            </a:extLst>
+          </p:cNvPr>
+          <p:cNvSpPr/>
+          <p:nvPr/>
+        </p:nvSpPr>
+        <p:spPr>
+          <a:xfrm>
+            <a:off x="1202635" y="712303"/>
+            <a:ext cx="1769165" cy="384311"/>
+          </a:xfrm>
+          <a:prstGeom prst="rect">
+            <a:avLst/>
+          </a:prstGeom>
+        </p:spPr>
+        <p:style>
+          <a:lnRef idx="2">
+            <a:schemeClr val="accent4">
+              <a:shade val="50000"/>
+            </a:schemeClr>
+          </a:lnRef>
+          <a:fillRef idx="1">
+            <a:schemeClr val="accent4"/>
+          </a:fillRef>
+          <a:effectRef idx="0">
+            <a:schemeClr val="accent4"/>
+          </a:effectRef>
+          <a:fontRef idx="minor">
+            <a:schemeClr val="lt1"/>
+          </a:fontRef>
+        </p:style>
+        <p:txBody>
+          <a:bodyPr rtlCol="0" anchor="ctr"/>
+          <a:lstStyle/>
+          <a:p>
+            <a:pPr algn="ctr"/>
+            <a:r>
+              <a:rPr lang="en-US" dirty="0"/>
+              <a:t>Nav-branch</a:t>
+            </a:r>
+          </a:p>
+        </p:txBody>
+      </p:sp>
+      <p:sp>
+        <p:nvSpPr>
+          <p:cNvPr id="13" name="Rectangle 12">
+            <a:extLst>
+              <a:ext uri="{FF2B5EF4-FFF2-40B4-BE49-F238E27FC236}">
+                <a16:creationId xmlns:a16="http://schemas.microsoft.com/office/drawing/2014/main" id="{6FA814F1-C42B-46F8-95CD-2F54D1FB6AF6}"/>
+              </a:ext>
+            </a:extLst>
+          </p:cNvPr>
+          <p:cNvSpPr/>
+          <p:nvPr/>
+        </p:nvSpPr>
+        <p:spPr>
+          <a:xfrm>
+            <a:off x="1202634" y="281608"/>
+            <a:ext cx="1769165" cy="384311"/>
+          </a:xfrm>
+          <a:prstGeom prst="rect">
+            <a:avLst/>
+          </a:prstGeom>
+        </p:spPr>
+        <p:style>
+          <a:lnRef idx="2">
+            <a:schemeClr val="accent4">
+              <a:shade val="50000"/>
+            </a:schemeClr>
+          </a:lnRef>
+          <a:fillRef idx="1">
+            <a:schemeClr val="accent4"/>
+          </a:fillRef>
+          <a:effectRef idx="0">
+            <a:schemeClr val="accent4"/>
+          </a:effectRef>
+          <a:fontRef idx="minor">
+            <a:schemeClr val="lt1"/>
+          </a:fontRef>
+        </p:style>
+        <p:txBody>
+          <a:bodyPr rtlCol="0" anchor="ctr"/>
+          <a:lstStyle/>
+          <a:p>
+            <a:pPr algn="ctr"/>
+            <a:r>
+              <a:rPr lang="en-US" dirty="0"/>
+              <a:t>master</a:t>
+            </a:r>
+          </a:p>
+        </p:txBody>
+      </p:sp>
+      <p:sp>
+        <p:nvSpPr>
+          <p:cNvPr id="15" name="Rectangle 14">
+            <a:extLst>
+              <a:ext uri="{FF2B5EF4-FFF2-40B4-BE49-F238E27FC236}">
+                <a16:creationId xmlns:a16="http://schemas.microsoft.com/office/drawing/2014/main" id="{5EBE15AF-1DA2-4435-B1A3-59C2FFB70B55}"/>
+              </a:ext>
+            </a:extLst>
+          </p:cNvPr>
+          <p:cNvSpPr/>
+          <p:nvPr/>
+        </p:nvSpPr>
+        <p:spPr>
+          <a:xfrm>
+            <a:off x="8378686" y="319710"/>
+            <a:ext cx="1769165" cy="384311"/>
+          </a:xfrm>
+          <a:prstGeom prst="rect">
+            <a:avLst/>
+          </a:prstGeom>
+        </p:spPr>
+        <p:style>
+          <a:lnRef idx="2">
+            <a:schemeClr val="accent4">
+              <a:shade val="50000"/>
+            </a:schemeClr>
+          </a:lnRef>
+          <a:fillRef idx="1">
+            <a:schemeClr val="accent4"/>
+          </a:fillRef>
+          <a:effectRef idx="0">
+            <a:schemeClr val="accent4"/>
+          </a:effectRef>
+          <a:fontRef idx="minor">
+            <a:schemeClr val="lt1"/>
+          </a:fontRef>
+        </p:style>
+        <p:txBody>
+          <a:bodyPr rtlCol="0" anchor="ctr"/>
+          <a:lstStyle/>
+          <a:p>
+            <a:pPr algn="ctr"/>
+            <a:r>
+              <a:rPr lang="en-US" dirty="0"/>
+              <a:t>master</a:t>
+            </a:r>
+          </a:p>
+        </p:txBody>
+      </p:sp>
+      <p:sp>
+        <p:nvSpPr>
+          <p:cNvPr id="17" name="Rectangle 16">
+            <a:extLst>
+              <a:ext uri="{FF2B5EF4-FFF2-40B4-BE49-F238E27FC236}">
+                <a16:creationId xmlns:a16="http://schemas.microsoft.com/office/drawing/2014/main" id="{DA53F8E6-23CD-4356-B6D5-3DD09266274E}"/>
+              </a:ext>
+            </a:extLst>
+          </p:cNvPr>
+          <p:cNvSpPr/>
+          <p:nvPr/>
+        </p:nvSpPr>
+        <p:spPr>
+          <a:xfrm>
+            <a:off x="8378686" y="800929"/>
+            <a:ext cx="1769165" cy="384311"/>
+          </a:xfrm>
+          <a:prstGeom prst="rect">
+            <a:avLst/>
+          </a:prstGeom>
+        </p:spPr>
+        <p:style>
+          <a:lnRef idx="2">
+            <a:schemeClr val="accent4">
+              <a:shade val="50000"/>
+            </a:schemeClr>
+          </a:lnRef>
+          <a:fillRef idx="1">
+            <a:schemeClr val="accent4"/>
+          </a:fillRef>
+          <a:effectRef idx="0">
+            <a:schemeClr val="accent4"/>
+          </a:effectRef>
+          <a:fontRef idx="minor">
+            <a:schemeClr val="lt1"/>
+          </a:fontRef>
+        </p:style>
+        <p:txBody>
+          <a:bodyPr rtlCol="0" anchor="ctr"/>
+          <a:lstStyle/>
+          <a:p>
+            <a:pPr algn="ctr"/>
+            <a:r>
+              <a:rPr lang="en-US" dirty="0"/>
+              <a:t>Nav-branch</a:t>
+            </a:r>
+          </a:p>
+        </p:txBody>
+      </p:sp>
+      <p:sp>
+        <p:nvSpPr>
+          <p:cNvPr id="20" name="TextBox 19">
+            <a:extLst>
+              <a:ext uri="{FF2B5EF4-FFF2-40B4-BE49-F238E27FC236}">
+                <a16:creationId xmlns:a16="http://schemas.microsoft.com/office/drawing/2014/main" id="{3A829383-CDD8-470D-8B7A-8229DF46ADBC}"/>
+              </a:ext>
+            </a:extLst>
+          </p:cNvPr>
+          <p:cNvSpPr txBox="1"/>
+          <p:nvPr/>
+        </p:nvSpPr>
+        <p:spPr>
+          <a:xfrm>
+            <a:off x="4177746" y="467139"/>
+            <a:ext cx="3525079" cy="369332"/>
+          </a:xfrm>
+          <a:prstGeom prst="rect">
+            <a:avLst/>
+          </a:prstGeom>
+          <a:noFill/>
+        </p:spPr>
+        <p:txBody>
+          <a:bodyPr wrap="square" rtlCol="0">
+            <a:spAutoFit/>
           </a:bodyPr>
           <a:lstStyle/>
           <a:p>
             <a:r>
-              <a:rPr lang="en-US" sz="2400" dirty="0"/>
-              <a:t>Standup meetings (mostly standing up)</a:t>
+              <a:rPr lang="en-US" dirty="0"/>
+              <a:t>Local vs Remote Repository</a:t>
+            </a:r>
+          </a:p>
+        </p:txBody>
+      </p:sp>
+      <p:sp>
+        <p:nvSpPr>
+          <p:cNvPr id="21" name="Explosion: 8 Points 20">
+            <a:extLst>
+              <a:ext uri="{FF2B5EF4-FFF2-40B4-BE49-F238E27FC236}">
+                <a16:creationId xmlns:a16="http://schemas.microsoft.com/office/drawing/2014/main" id="{7C89E4AD-46FB-4A5C-A6FA-69FD97F4667C}"/>
+              </a:ext>
+            </a:extLst>
+          </p:cNvPr>
+          <p:cNvSpPr/>
+          <p:nvPr/>
+        </p:nvSpPr>
+        <p:spPr>
+          <a:xfrm>
+            <a:off x="9743660" y="1349236"/>
+            <a:ext cx="1361662" cy="725556"/>
+          </a:xfrm>
+          <a:prstGeom prst="irregularSeal1">
+            <a:avLst/>
+          </a:prstGeom>
+        </p:spPr>
+        <p:style>
+          <a:lnRef idx="2">
+            <a:schemeClr val="accent4">
+              <a:shade val="50000"/>
+            </a:schemeClr>
+          </a:lnRef>
+          <a:fillRef idx="1">
+            <a:schemeClr val="accent4"/>
+          </a:fillRef>
+          <a:effectRef idx="0">
+            <a:schemeClr val="accent4"/>
+          </a:effectRef>
+          <a:fontRef idx="minor">
+            <a:schemeClr val="lt1"/>
+          </a:fontRef>
+        </p:style>
+        <p:txBody>
+          <a:bodyPr rtlCol="0" anchor="ctr"/>
+          <a:lstStyle/>
+          <a:p>
+            <a:pPr algn="ctr"/>
+            <a:r>
+              <a:rPr lang="en-US" dirty="0"/>
+              <a:t>origin</a:t>
             </a:r>
           </a:p>
         </p:txBody>
@@ -5305,7 +7185,7 @@
     </p:spTree>
     <p:extLst>
       <p:ext uri="{BB962C8B-B14F-4D97-AF65-F5344CB8AC3E}">
-        <p14:creationId xmlns:p14="http://schemas.microsoft.com/office/powerpoint/2010/main" val="2292001013"/>
+        <p14:creationId xmlns:p14="http://schemas.microsoft.com/office/powerpoint/2010/main" val="2450643964"/>
       </p:ext>
     </p:extLst>
   </p:cSld>

</xml_diff>

<commit_message>
added json server and AJAX exmple + equivalent fetch example
</commit_message>
<xml_diff>
--- a/5Week-FrontEnd/FrontEnd-SDLC.pptx
+++ b/5Week-FrontEnd/FrontEnd-SDLC.pptx
@@ -208,7 +208,7 @@
           <a:p>
             <a:fld id="{53711AE8-47F5-4C2B-95DC-830CB5EC5957}" type="datetimeFigureOut">
               <a:rPr lang="en-US" smtClean="0"/>
-              <a:t>9/15/2020</a:t>
+              <a:t>9/17/2020</a:t>
             </a:fld>
             <a:endParaRPr lang="en-US"/>
           </a:p>
@@ -706,7 +706,7 @@
           <a:p>
             <a:fld id="{7240729C-CA27-4969-9500-66C0A4D7EAB6}" type="datetimeFigureOut">
               <a:rPr lang="en-US" smtClean="0"/>
-              <a:t>9/15/2020</a:t>
+              <a:t>9/17/2020</a:t>
             </a:fld>
             <a:endParaRPr lang="en-US"/>
           </a:p>
@@ -904,7 +904,7 @@
           <a:p>
             <a:fld id="{7240729C-CA27-4969-9500-66C0A4D7EAB6}" type="datetimeFigureOut">
               <a:rPr lang="en-US" smtClean="0"/>
-              <a:t>9/15/2020</a:t>
+              <a:t>9/17/2020</a:t>
             </a:fld>
             <a:endParaRPr lang="en-US"/>
           </a:p>
@@ -1112,7 +1112,7 @@
           <a:p>
             <a:fld id="{7240729C-CA27-4969-9500-66C0A4D7EAB6}" type="datetimeFigureOut">
               <a:rPr lang="en-US" smtClean="0"/>
-              <a:t>9/15/2020</a:t>
+              <a:t>9/17/2020</a:t>
             </a:fld>
             <a:endParaRPr lang="en-US"/>
           </a:p>
@@ -1310,7 +1310,7 @@
           <a:p>
             <a:fld id="{7240729C-CA27-4969-9500-66C0A4D7EAB6}" type="datetimeFigureOut">
               <a:rPr lang="en-US" smtClean="0"/>
-              <a:t>9/15/2020</a:t>
+              <a:t>9/17/2020</a:t>
             </a:fld>
             <a:endParaRPr lang="en-US"/>
           </a:p>
@@ -1585,7 +1585,7 @@
           <a:p>
             <a:fld id="{7240729C-CA27-4969-9500-66C0A4D7EAB6}" type="datetimeFigureOut">
               <a:rPr lang="en-US" smtClean="0"/>
-              <a:t>9/15/2020</a:t>
+              <a:t>9/17/2020</a:t>
             </a:fld>
             <a:endParaRPr lang="en-US"/>
           </a:p>
@@ -1850,7 +1850,7 @@
           <a:p>
             <a:fld id="{7240729C-CA27-4969-9500-66C0A4D7EAB6}" type="datetimeFigureOut">
               <a:rPr lang="en-US" smtClean="0"/>
-              <a:t>9/15/2020</a:t>
+              <a:t>9/17/2020</a:t>
             </a:fld>
             <a:endParaRPr lang="en-US"/>
           </a:p>
@@ -2262,7 +2262,7 @@
           <a:p>
             <a:fld id="{7240729C-CA27-4969-9500-66C0A4D7EAB6}" type="datetimeFigureOut">
               <a:rPr lang="en-US" smtClean="0"/>
-              <a:t>9/15/2020</a:t>
+              <a:t>9/17/2020</a:t>
             </a:fld>
             <a:endParaRPr lang="en-US"/>
           </a:p>
@@ -2403,7 +2403,7 @@
           <a:p>
             <a:fld id="{7240729C-CA27-4969-9500-66C0A4D7EAB6}" type="datetimeFigureOut">
               <a:rPr lang="en-US" smtClean="0"/>
-              <a:t>9/15/2020</a:t>
+              <a:t>9/17/2020</a:t>
             </a:fld>
             <a:endParaRPr lang="en-US"/>
           </a:p>
@@ -2516,7 +2516,7 @@
           <a:p>
             <a:fld id="{7240729C-CA27-4969-9500-66C0A4D7EAB6}" type="datetimeFigureOut">
               <a:rPr lang="en-US" smtClean="0"/>
-              <a:t>9/15/2020</a:t>
+              <a:t>9/17/2020</a:t>
             </a:fld>
             <a:endParaRPr lang="en-US"/>
           </a:p>
@@ -2827,7 +2827,7 @@
           <a:p>
             <a:fld id="{7240729C-CA27-4969-9500-66C0A4D7EAB6}" type="datetimeFigureOut">
               <a:rPr lang="en-US" smtClean="0"/>
-              <a:t>9/15/2020</a:t>
+              <a:t>9/17/2020</a:t>
             </a:fld>
             <a:endParaRPr lang="en-US"/>
           </a:p>
@@ -3115,7 +3115,7 @@
           <a:p>
             <a:fld id="{7240729C-CA27-4969-9500-66C0A4D7EAB6}" type="datetimeFigureOut">
               <a:rPr lang="en-US" smtClean="0"/>
-              <a:t>9/15/2020</a:t>
+              <a:t>9/17/2020</a:t>
             </a:fld>
             <a:endParaRPr lang="en-US"/>
           </a:p>
@@ -3356,7 +3356,7 @@
           <a:p>
             <a:fld id="{7240729C-CA27-4969-9500-66C0A4D7EAB6}" type="datetimeFigureOut">
               <a:rPr lang="en-US" smtClean="0"/>
-              <a:t>9/15/2020</a:t>
+              <a:t>9/17/2020</a:t>
             </a:fld>
             <a:endParaRPr lang="en-US"/>
           </a:p>

</xml_diff>

<commit_message>
added pdf of powerpoint
</commit_message>
<xml_diff>
--- a/5Week-FrontEnd/FrontEnd-SDLC.pptx
+++ b/5Week-FrontEnd/FrontEnd-SDLC.pptx
@@ -5,7 +5,7 @@
     <p:sldMasterId id="2147483648" r:id="rId1"/>
   </p:sldMasterIdLst>
   <p:notesMasterIdLst>
-    <p:notesMasterId r:id="rId14"/>
+    <p:notesMasterId r:id="rId15"/>
   </p:notesMasterIdLst>
   <p:sldIdLst>
     <p:sldId id="256" r:id="rId2"/>
@@ -18,8 +18,9 @@
     <p:sldId id="265" r:id="rId9"/>
     <p:sldId id="266" r:id="rId10"/>
     <p:sldId id="267" r:id="rId11"/>
-    <p:sldId id="262" r:id="rId12"/>
-    <p:sldId id="263" r:id="rId13"/>
+    <p:sldId id="268" r:id="rId12"/>
+    <p:sldId id="262" r:id="rId13"/>
+    <p:sldId id="263" r:id="rId14"/>
   </p:sldIdLst>
   <p:sldSz cx="12192000" cy="6858000"/>
   <p:notesSz cx="6858000" cy="9144000"/>
@@ -208,7 +209,7 @@
           <a:p>
             <a:fld id="{53711AE8-47F5-4C2B-95DC-830CB5EC5957}" type="datetimeFigureOut">
               <a:rPr lang="en-US" smtClean="0"/>
-              <a:t>9/17/2020</a:t>
+              <a:t>9/18/2020</a:t>
             </a:fld>
             <a:endParaRPr lang="en-US"/>
           </a:p>
@@ -706,7 +707,7 @@
           <a:p>
             <a:fld id="{7240729C-CA27-4969-9500-66C0A4D7EAB6}" type="datetimeFigureOut">
               <a:rPr lang="en-US" smtClean="0"/>
-              <a:t>9/17/2020</a:t>
+              <a:t>9/18/2020</a:t>
             </a:fld>
             <a:endParaRPr lang="en-US"/>
           </a:p>
@@ -904,7 +905,7 @@
           <a:p>
             <a:fld id="{7240729C-CA27-4969-9500-66C0A4D7EAB6}" type="datetimeFigureOut">
               <a:rPr lang="en-US" smtClean="0"/>
-              <a:t>9/17/2020</a:t>
+              <a:t>9/18/2020</a:t>
             </a:fld>
             <a:endParaRPr lang="en-US"/>
           </a:p>
@@ -1112,7 +1113,7 @@
           <a:p>
             <a:fld id="{7240729C-CA27-4969-9500-66C0A4D7EAB6}" type="datetimeFigureOut">
               <a:rPr lang="en-US" smtClean="0"/>
-              <a:t>9/17/2020</a:t>
+              <a:t>9/18/2020</a:t>
             </a:fld>
             <a:endParaRPr lang="en-US"/>
           </a:p>
@@ -1310,7 +1311,7 @@
           <a:p>
             <a:fld id="{7240729C-CA27-4969-9500-66C0A4D7EAB6}" type="datetimeFigureOut">
               <a:rPr lang="en-US" smtClean="0"/>
-              <a:t>9/17/2020</a:t>
+              <a:t>9/18/2020</a:t>
             </a:fld>
             <a:endParaRPr lang="en-US"/>
           </a:p>
@@ -1585,7 +1586,7 @@
           <a:p>
             <a:fld id="{7240729C-CA27-4969-9500-66C0A4D7EAB6}" type="datetimeFigureOut">
               <a:rPr lang="en-US" smtClean="0"/>
-              <a:t>9/17/2020</a:t>
+              <a:t>9/18/2020</a:t>
             </a:fld>
             <a:endParaRPr lang="en-US"/>
           </a:p>
@@ -1850,7 +1851,7 @@
           <a:p>
             <a:fld id="{7240729C-CA27-4969-9500-66C0A4D7EAB6}" type="datetimeFigureOut">
               <a:rPr lang="en-US" smtClean="0"/>
-              <a:t>9/17/2020</a:t>
+              <a:t>9/18/2020</a:t>
             </a:fld>
             <a:endParaRPr lang="en-US"/>
           </a:p>
@@ -2262,7 +2263,7 @@
           <a:p>
             <a:fld id="{7240729C-CA27-4969-9500-66C0A4D7EAB6}" type="datetimeFigureOut">
               <a:rPr lang="en-US" smtClean="0"/>
-              <a:t>9/17/2020</a:t>
+              <a:t>9/18/2020</a:t>
             </a:fld>
             <a:endParaRPr lang="en-US"/>
           </a:p>
@@ -2403,7 +2404,7 @@
           <a:p>
             <a:fld id="{7240729C-CA27-4969-9500-66C0A4D7EAB6}" type="datetimeFigureOut">
               <a:rPr lang="en-US" smtClean="0"/>
-              <a:t>9/17/2020</a:t>
+              <a:t>9/18/2020</a:t>
             </a:fld>
             <a:endParaRPr lang="en-US"/>
           </a:p>
@@ -2516,7 +2517,7 @@
           <a:p>
             <a:fld id="{7240729C-CA27-4969-9500-66C0A4D7EAB6}" type="datetimeFigureOut">
               <a:rPr lang="en-US" smtClean="0"/>
-              <a:t>9/17/2020</a:t>
+              <a:t>9/18/2020</a:t>
             </a:fld>
             <a:endParaRPr lang="en-US"/>
           </a:p>
@@ -2827,7 +2828,7 @@
           <a:p>
             <a:fld id="{7240729C-CA27-4969-9500-66C0A4D7EAB6}" type="datetimeFigureOut">
               <a:rPr lang="en-US" smtClean="0"/>
-              <a:t>9/17/2020</a:t>
+              <a:t>9/18/2020</a:t>
             </a:fld>
             <a:endParaRPr lang="en-US"/>
           </a:p>
@@ -3115,7 +3116,7 @@
           <a:p>
             <a:fld id="{7240729C-CA27-4969-9500-66C0A4D7EAB6}" type="datetimeFigureOut">
               <a:rPr lang="en-US" smtClean="0"/>
-              <a:t>9/17/2020</a:t>
+              <a:t>9/18/2020</a:t>
             </a:fld>
             <a:endParaRPr lang="en-US"/>
           </a:p>
@@ -3356,7 +3357,7 @@
           <a:p>
             <a:fld id="{7240729C-CA27-4969-9500-66C0A4D7EAB6}" type="datetimeFigureOut">
               <a:rPr lang="en-US" smtClean="0"/>
-              <a:t>9/17/2020</a:t>
+              <a:t>9/18/2020</a:t>
             </a:fld>
             <a:endParaRPr lang="en-US"/>
           </a:p>
@@ -4374,14 +4375,6 @@
 <file path=ppt/slides/slide11.xml><?xml version="1.0" encoding="utf-8"?>
 <p:sld xmlns:a="http://schemas.openxmlformats.org/drawingml/2006/main" xmlns:r="http://schemas.openxmlformats.org/officeDocument/2006/relationships" xmlns:p="http://schemas.openxmlformats.org/presentationml/2006/main">
   <p:cSld>
-    <p:bg>
-      <p:bgPr>
-        <a:solidFill>
-          <a:schemeClr val="bg1"/>
-        </a:solidFill>
-        <a:effectLst/>
-      </p:bgPr>
-    </p:bg>
     <p:spTree>
       <p:nvGrpSpPr>
         <p:cNvPr id="1" name=""/>
@@ -4401,7 +4394,7 @@
           <p:cNvPr id="2" name="Title 1">
             <a:extLst>
               <a:ext uri="{FF2B5EF4-FFF2-40B4-BE49-F238E27FC236}">
-                <a16:creationId xmlns:a16="http://schemas.microsoft.com/office/drawing/2014/main" id="{327E1693-2666-4D48-9CFA-C4CC365BF226}"/>
+                <a16:creationId xmlns:a16="http://schemas.microsoft.com/office/drawing/2014/main" id="{844E5410-7095-4332-A04F-2AE82184692B}"/>
               </a:ext>
             </a:extLst>
           </p:cNvPr>
@@ -4412,155 +4405,396 @@
             <p:ph type="title"/>
           </p:nvPr>
         </p:nvSpPr>
-        <p:spPr>
-          <a:xfrm>
-            <a:off x="960100" y="978102"/>
-            <a:ext cx="10588434" cy="1062644"/>
-          </a:xfrm>
-        </p:spPr>
-        <p:txBody>
-          <a:bodyPr anchor="b">
-            <a:normAutofit/>
-          </a:bodyPr>
+        <p:spPr/>
+        <p:txBody>
+          <a:bodyPr/>
           <a:lstStyle/>
           <a:p>
             <a:r>
               <a:rPr lang="en-US" dirty="0"/>
-              <a:t>Things that I like about the tech.</a:t>
-            </a:r>
-          </a:p>
-        </p:txBody>
-      </p:sp>
-      <p:cxnSp>
-        <p:nvCxnSpPr>
-          <p:cNvPr id="12" name="Straight Connector 11">
-            <a:extLst>
-              <a:ext uri="{FF2B5EF4-FFF2-40B4-BE49-F238E27FC236}">
-                <a16:creationId xmlns:a16="http://schemas.microsoft.com/office/drawing/2014/main" id="{39B7FDC9-F0CE-43A7-9F2A-83DD09DC3453}"/>
-              </a:ext>
-              <a:ext uri="{C183D7F6-B498-43B3-948B-1728B52AA6E4}">
-                <adec:decorative xmlns:adec="http://schemas.microsoft.com/office/drawing/2017/decorative" val="1"/>
-              </a:ext>
-            </a:extLst>
-          </p:cNvPr>
-          <p:cNvCxnSpPr>
-            <a:cxnSpLocks noGrp="1" noRot="1" noChangeAspect="1" noMove="1" noResize="1" noEditPoints="1" noAdjustHandles="1" noChangeArrowheads="1" noChangeShapeType="1"/>
-          </p:cNvCxnSpPr>
-          <p:nvPr>
-            <p:extLst>
-              <p:ext uri="{386F3935-93C4-4BCD-93E2-E3B085C9AB24}">
-                <p16:designElem xmlns:p16="http://schemas.microsoft.com/office/powerpoint/2015/main" val="1"/>
-              </p:ext>
-            </p:extLst>
-          </p:nvPr>
-        </p:nvCxnSpPr>
-        <p:spPr>
-          <a:xfrm>
-            <a:off x="1047624" y="2265037"/>
-            <a:ext cx="10125012" cy="0"/>
-          </a:xfrm>
-          <a:prstGeom prst="line">
+              <a:t>Bubbling and Capturing</a:t>
+            </a:r>
+          </a:p>
+        </p:txBody>
+      </p:sp>
+      <p:sp>
+        <p:nvSpPr>
+          <p:cNvPr id="4" name="Rectangle 3">
+            <a:extLst>
+              <a:ext uri="{FF2B5EF4-FFF2-40B4-BE49-F238E27FC236}">
+                <a16:creationId xmlns:a16="http://schemas.microsoft.com/office/drawing/2014/main" id="{498E1C57-6A52-4452-91E0-A1C7128AD4C6}"/>
+              </a:ext>
+            </a:extLst>
+          </p:cNvPr>
+          <p:cNvSpPr/>
+          <p:nvPr/>
+        </p:nvSpPr>
+        <p:spPr>
+          <a:xfrm>
+            <a:off x="2653748" y="1769165"/>
+            <a:ext cx="8468139" cy="3886200"/>
+          </a:xfrm>
+          <a:prstGeom prst="rect">
             <a:avLst/>
           </a:prstGeom>
-          <a:ln w="15875">
-            <a:solidFill>
-              <a:schemeClr val="tx1">
-                <a:lumMod val="65000"/>
-                <a:lumOff val="35000"/>
-              </a:schemeClr>
-            </a:solidFill>
-          </a:ln>
         </p:spPr>
         <p:style>
-          <a:lnRef idx="1">
-            <a:schemeClr val="accent1"/>
+          <a:lnRef idx="2">
+            <a:schemeClr val="accent1">
+              <a:shade val="50000"/>
+            </a:schemeClr>
           </a:lnRef>
-          <a:fillRef idx="0">
+          <a:fillRef idx="1">
             <a:schemeClr val="accent1"/>
           </a:fillRef>
           <a:effectRef idx="0">
             <a:schemeClr val="accent1"/>
           </a:effectRef>
           <a:fontRef idx="minor">
-            <a:schemeClr val="tx1"/>
+            <a:schemeClr val="lt1"/>
           </a:fontRef>
         </p:style>
-      </p:cxnSp>
-      <p:pic>
-        <p:nvPicPr>
-          <p:cNvPr id="5" name="Content Placeholder 4" descr="Angel face with solid fill">
-            <a:extLst>
-              <a:ext uri="{FF2B5EF4-FFF2-40B4-BE49-F238E27FC236}">
-                <a16:creationId xmlns:a16="http://schemas.microsoft.com/office/drawing/2014/main" id="{831A082B-9A5E-4DF2-B2E5-B3DB1B6C21F4}"/>
-              </a:ext>
-            </a:extLst>
-          </p:cNvPr>
-          <p:cNvPicPr>
-            <a:picLocks noChangeAspect="1"/>
-          </p:cNvPicPr>
+        <p:txBody>
+          <a:bodyPr rtlCol="0" anchor="ctr"/>
+          <a:lstStyle/>
+          <a:p>
+            <a:pPr algn="ctr"/>
+            <a:endParaRPr lang="en-US"/>
+          </a:p>
+        </p:txBody>
+      </p:sp>
+      <p:sp>
+        <p:nvSpPr>
+          <p:cNvPr id="6" name="Rectangle 5">
+            <a:extLst>
+              <a:ext uri="{FF2B5EF4-FFF2-40B4-BE49-F238E27FC236}">
+                <a16:creationId xmlns:a16="http://schemas.microsoft.com/office/drawing/2014/main" id="{7C63EA56-D095-4B8D-8657-FA5EF02D0E3E}"/>
+              </a:ext>
+            </a:extLst>
+          </p:cNvPr>
+          <p:cNvSpPr/>
           <p:nvPr/>
-        </p:nvPicPr>
-        <p:blipFill>
-          <a:blip r:embed="rId2">
-            <a:extLst>
-              <a:ext uri="{28A0092B-C50C-407E-A947-70E740481C1C}">
-                <a14:useLocalDpi xmlns:a14="http://schemas.microsoft.com/office/drawing/2010/main" val="0"/>
-              </a:ext>
-              <a:ext uri="{96DAC541-7B7A-43D3-8B79-37D633B846F1}">
-                <asvg:svgBlip xmlns:asvg="http://schemas.microsoft.com/office/drawing/2016/SVG/main" r:embed="rId3"/>
-              </a:ext>
-            </a:extLst>
-          </a:blip>
-          <a:stretch>
-            <a:fillRect/>
-          </a:stretch>
-        </p:blipFill>
-        <p:spPr>
-          <a:xfrm>
-            <a:off x="1333206" y="2811104"/>
-            <a:ext cx="2928114" cy="2928114"/>
+        </p:nvSpPr>
+        <p:spPr>
+          <a:xfrm>
+            <a:off x="4280451" y="2365510"/>
+            <a:ext cx="5241235" cy="2378765"/>
           </a:xfrm>
           <a:prstGeom prst="rect">
             <a:avLst/>
           </a:prstGeom>
         </p:spPr>
-      </p:pic>
-      <p:sp>
-        <p:nvSpPr>
-          <p:cNvPr id="9" name="Content Placeholder 8">
-            <a:extLst>
-              <a:ext uri="{FF2B5EF4-FFF2-40B4-BE49-F238E27FC236}">
-                <a16:creationId xmlns:a16="http://schemas.microsoft.com/office/drawing/2014/main" id="{643115F0-0C4F-4E88-9D42-E6C8EBF41A53}"/>
-              </a:ext>
-            </a:extLst>
-          </p:cNvPr>
-          <p:cNvSpPr>
-            <a:spLocks noGrp="1"/>
-          </p:cNvSpPr>
-          <p:nvPr>
-            <p:ph idx="1"/>
-          </p:nvPr>
-        </p:nvSpPr>
-        <p:spPr>
-          <a:xfrm>
-            <a:off x="4955354" y="2682433"/>
-            <a:ext cx="6282169" cy="3215749"/>
-          </a:xfrm>
-        </p:spPr>
-        <p:txBody>
-          <a:bodyPr>
-            <a:normAutofit/>
-          </a:bodyPr>
-          <a:lstStyle/>
-          <a:p>
-            <a:endParaRPr lang="en-US" sz="2400"/>
+        <p:style>
+          <a:lnRef idx="2">
+            <a:schemeClr val="accent6">
+              <a:shade val="50000"/>
+            </a:schemeClr>
+          </a:lnRef>
+          <a:fillRef idx="1">
+            <a:schemeClr val="accent6"/>
+          </a:fillRef>
+          <a:effectRef idx="0">
+            <a:schemeClr val="accent6"/>
+          </a:effectRef>
+          <a:fontRef idx="minor">
+            <a:schemeClr val="lt1"/>
+          </a:fontRef>
+        </p:style>
+        <p:txBody>
+          <a:bodyPr rtlCol="0" anchor="ctr"/>
+          <a:lstStyle/>
+          <a:p>
+            <a:pPr algn="ctr"/>
+            <a:endParaRPr lang="en-US" dirty="0"/>
+          </a:p>
+        </p:txBody>
+      </p:sp>
+      <p:sp>
+        <p:nvSpPr>
+          <p:cNvPr id="8" name="Rectangle 7">
+            <a:extLst>
+              <a:ext uri="{FF2B5EF4-FFF2-40B4-BE49-F238E27FC236}">
+                <a16:creationId xmlns:a16="http://schemas.microsoft.com/office/drawing/2014/main" id="{AA8F58C6-00C3-426C-BD65-F51A0CDA1BFE}"/>
+              </a:ext>
+            </a:extLst>
+          </p:cNvPr>
+          <p:cNvSpPr/>
+          <p:nvPr/>
+        </p:nvSpPr>
+        <p:spPr>
+          <a:xfrm>
+            <a:off x="5314119" y="2818570"/>
+            <a:ext cx="3147393" cy="1472647"/>
+          </a:xfrm>
+          <a:prstGeom prst="rect">
+            <a:avLst/>
+          </a:prstGeom>
+        </p:spPr>
+        <p:style>
+          <a:lnRef idx="2">
+            <a:schemeClr val="accent4">
+              <a:shade val="50000"/>
+            </a:schemeClr>
+          </a:lnRef>
+          <a:fillRef idx="1">
+            <a:schemeClr val="accent4"/>
+          </a:fillRef>
+          <a:effectRef idx="0">
+            <a:schemeClr val="accent4"/>
+          </a:effectRef>
+          <a:fontRef idx="minor">
+            <a:schemeClr val="lt1"/>
+          </a:fontRef>
+        </p:style>
+        <p:txBody>
+          <a:bodyPr rtlCol="0" anchor="ctr"/>
+          <a:lstStyle/>
+          <a:p>
+            <a:pPr algn="ctr"/>
+            <a:endParaRPr lang="en-US" dirty="0"/>
+          </a:p>
+        </p:txBody>
+      </p:sp>
+      <p:sp>
+        <p:nvSpPr>
+          <p:cNvPr id="9" name="Explosion: 8 Points 8">
+            <a:extLst>
+              <a:ext uri="{FF2B5EF4-FFF2-40B4-BE49-F238E27FC236}">
+                <a16:creationId xmlns:a16="http://schemas.microsoft.com/office/drawing/2014/main" id="{CDA0ED3A-4A8E-4035-8329-8AAAB78E0118}"/>
+              </a:ext>
+            </a:extLst>
+          </p:cNvPr>
+          <p:cNvSpPr/>
+          <p:nvPr/>
+        </p:nvSpPr>
+        <p:spPr>
+          <a:xfrm>
+            <a:off x="4043568" y="4005470"/>
+            <a:ext cx="914400" cy="964095"/>
+          </a:xfrm>
+          <a:prstGeom prst="irregularSeal1">
+            <a:avLst/>
+          </a:prstGeom>
+        </p:spPr>
+        <p:style>
+          <a:lnRef idx="2">
+            <a:schemeClr val="accent2">
+              <a:shade val="50000"/>
+            </a:schemeClr>
+          </a:lnRef>
+          <a:fillRef idx="1">
+            <a:schemeClr val="accent2"/>
+          </a:fillRef>
+          <a:effectRef idx="0">
+            <a:schemeClr val="accent2"/>
+          </a:effectRef>
+          <a:fontRef idx="minor">
+            <a:schemeClr val="lt1"/>
+          </a:fontRef>
+        </p:style>
+        <p:txBody>
+          <a:bodyPr rtlCol="0" anchor="ctr"/>
+          <a:lstStyle/>
+          <a:p>
+            <a:pPr algn="ctr"/>
+            <a:endParaRPr lang="en-US"/>
+          </a:p>
+        </p:txBody>
+      </p:sp>
+      <p:sp>
+        <p:nvSpPr>
+          <p:cNvPr id="11" name="Explosion: 8 Points 10">
+            <a:extLst>
+              <a:ext uri="{FF2B5EF4-FFF2-40B4-BE49-F238E27FC236}">
+                <a16:creationId xmlns:a16="http://schemas.microsoft.com/office/drawing/2014/main" id="{1AA542FB-1B22-424F-BAFC-3395D10C9EAD}"/>
+              </a:ext>
+            </a:extLst>
+          </p:cNvPr>
+          <p:cNvSpPr/>
+          <p:nvPr/>
+        </p:nvSpPr>
+        <p:spPr>
+          <a:xfrm>
+            <a:off x="2241274" y="4691270"/>
+            <a:ext cx="914400" cy="964095"/>
+          </a:xfrm>
+          <a:prstGeom prst="irregularSeal1">
+            <a:avLst/>
+          </a:prstGeom>
+        </p:spPr>
+        <p:style>
+          <a:lnRef idx="2">
+            <a:schemeClr val="accent2">
+              <a:shade val="50000"/>
+            </a:schemeClr>
+          </a:lnRef>
+          <a:fillRef idx="1">
+            <a:schemeClr val="accent2"/>
+          </a:fillRef>
+          <a:effectRef idx="0">
+            <a:schemeClr val="accent2"/>
+          </a:effectRef>
+          <a:fontRef idx="minor">
+            <a:schemeClr val="lt1"/>
+          </a:fontRef>
+        </p:style>
+        <p:txBody>
+          <a:bodyPr rtlCol="0" anchor="ctr"/>
+          <a:lstStyle/>
+          <a:p>
+            <a:pPr algn="ctr"/>
+            <a:endParaRPr lang="en-US"/>
+          </a:p>
+        </p:txBody>
+      </p:sp>
+      <p:sp>
+        <p:nvSpPr>
+          <p:cNvPr id="13" name="Explosion: 8 Points 12">
+            <a:extLst>
+              <a:ext uri="{FF2B5EF4-FFF2-40B4-BE49-F238E27FC236}">
+                <a16:creationId xmlns:a16="http://schemas.microsoft.com/office/drawing/2014/main" id="{08A36439-9556-4E27-8E44-B72BF8867263}"/>
+              </a:ext>
+            </a:extLst>
+          </p:cNvPr>
+          <p:cNvSpPr/>
+          <p:nvPr/>
+        </p:nvSpPr>
+        <p:spPr>
+          <a:xfrm>
+            <a:off x="5290929" y="3554892"/>
+            <a:ext cx="914400" cy="964095"/>
+          </a:xfrm>
+          <a:prstGeom prst="irregularSeal1">
+            <a:avLst/>
+          </a:prstGeom>
+        </p:spPr>
+        <p:style>
+          <a:lnRef idx="2">
+            <a:schemeClr val="accent2">
+              <a:shade val="50000"/>
+            </a:schemeClr>
+          </a:lnRef>
+          <a:fillRef idx="1">
+            <a:schemeClr val="accent2"/>
+          </a:fillRef>
+          <a:effectRef idx="0">
+            <a:schemeClr val="accent2"/>
+          </a:effectRef>
+          <a:fontRef idx="minor">
+            <a:schemeClr val="lt1"/>
+          </a:fontRef>
+        </p:style>
+        <p:txBody>
+          <a:bodyPr rtlCol="0" anchor="ctr"/>
+          <a:lstStyle/>
+          <a:p>
+            <a:pPr algn="ctr"/>
+            <a:endParaRPr lang="en-US"/>
+          </a:p>
+        </p:txBody>
+      </p:sp>
+      <p:sp>
+        <p:nvSpPr>
+          <p:cNvPr id="15" name="Arrow: Right 14">
+            <a:extLst>
+              <a:ext uri="{FF2B5EF4-FFF2-40B4-BE49-F238E27FC236}">
+                <a16:creationId xmlns:a16="http://schemas.microsoft.com/office/drawing/2014/main" id="{F2BD3A9A-E30F-4097-B8DB-D0E8A1605EFD}"/>
+              </a:ext>
+            </a:extLst>
+          </p:cNvPr>
+          <p:cNvSpPr/>
+          <p:nvPr/>
+        </p:nvSpPr>
+        <p:spPr>
+          <a:xfrm rot="16200000">
+            <a:off x="6200361" y="1662181"/>
+            <a:ext cx="3558208" cy="964095"/>
+          </a:xfrm>
+          <a:prstGeom prst="rightArrow">
+            <a:avLst/>
+          </a:prstGeom>
+        </p:spPr>
+        <p:style>
+          <a:lnRef idx="2">
+            <a:schemeClr val="accent5">
+              <a:shade val="50000"/>
+            </a:schemeClr>
+          </a:lnRef>
+          <a:fillRef idx="1">
+            <a:schemeClr val="accent5"/>
+          </a:fillRef>
+          <a:effectRef idx="0">
+            <a:schemeClr val="accent5"/>
+          </a:effectRef>
+          <a:fontRef idx="minor">
+            <a:schemeClr val="lt1"/>
+          </a:fontRef>
+        </p:style>
+        <p:txBody>
+          <a:bodyPr rtlCol="0" anchor="ctr"/>
+          <a:lstStyle/>
+          <a:p>
+            <a:pPr algn="ctr"/>
+            <a:r>
+              <a:rPr lang="en-US" dirty="0"/>
+              <a:t>Bubbling</a:t>
+            </a:r>
+          </a:p>
+        </p:txBody>
+      </p:sp>
+      <p:sp>
+        <p:nvSpPr>
+          <p:cNvPr id="17" name="Arrow: Right 16">
+            <a:extLst>
+              <a:ext uri="{FF2B5EF4-FFF2-40B4-BE49-F238E27FC236}">
+                <a16:creationId xmlns:a16="http://schemas.microsoft.com/office/drawing/2014/main" id="{F153D283-025F-4DAD-9053-48C0FFA8A758}"/>
+              </a:ext>
+            </a:extLst>
+          </p:cNvPr>
+          <p:cNvSpPr/>
+          <p:nvPr/>
+        </p:nvSpPr>
+        <p:spPr>
+          <a:xfrm rot="5400000">
+            <a:off x="5320746" y="1790355"/>
+            <a:ext cx="3558208" cy="964095"/>
+          </a:xfrm>
+          <a:prstGeom prst="rightArrow">
+            <a:avLst/>
+          </a:prstGeom>
+        </p:spPr>
+        <p:style>
+          <a:lnRef idx="2">
+            <a:schemeClr val="accent5">
+              <a:shade val="50000"/>
+            </a:schemeClr>
+          </a:lnRef>
+          <a:fillRef idx="1">
+            <a:schemeClr val="accent5"/>
+          </a:fillRef>
+          <a:effectRef idx="0">
+            <a:schemeClr val="accent5"/>
+          </a:effectRef>
+          <a:fontRef idx="minor">
+            <a:schemeClr val="lt1"/>
+          </a:fontRef>
+        </p:style>
+        <p:txBody>
+          <a:bodyPr rtlCol="0" anchor="ctr"/>
+          <a:lstStyle/>
+          <a:p>
+            <a:pPr algn="ctr"/>
+            <a:r>
+              <a:rPr lang="en-US" dirty="0"/>
+              <a:t>Capturing</a:t>
+            </a:r>
           </a:p>
         </p:txBody>
       </p:sp>
     </p:spTree>
     <p:extLst>
       <p:ext uri="{BB962C8B-B14F-4D97-AF65-F5344CB8AC3E}">
-        <p14:creationId xmlns:p14="http://schemas.microsoft.com/office/powerpoint/2010/main" val="275338840"/>
+        <p14:creationId xmlns:p14="http://schemas.microsoft.com/office/powerpoint/2010/main" val="1198798150"/>
       </p:ext>
     </p:extLst>
   </p:cSld>
@@ -4600,6 +4834,257 @@
           <p:cNvPr id="2" name="Title 1">
             <a:extLst>
               <a:ext uri="{FF2B5EF4-FFF2-40B4-BE49-F238E27FC236}">
+                <a16:creationId xmlns:a16="http://schemas.microsoft.com/office/drawing/2014/main" id="{327E1693-2666-4D48-9CFA-C4CC365BF226}"/>
+              </a:ext>
+            </a:extLst>
+          </p:cNvPr>
+          <p:cNvSpPr>
+            <a:spLocks noGrp="1"/>
+          </p:cNvSpPr>
+          <p:nvPr>
+            <p:ph type="title"/>
+          </p:nvPr>
+        </p:nvSpPr>
+        <p:spPr>
+          <a:xfrm>
+            <a:off x="960100" y="978102"/>
+            <a:ext cx="10588434" cy="1062644"/>
+          </a:xfrm>
+        </p:spPr>
+        <p:txBody>
+          <a:bodyPr anchor="b">
+            <a:normAutofit/>
+          </a:bodyPr>
+          <a:lstStyle/>
+          <a:p>
+            <a:r>
+              <a:rPr lang="en-US" dirty="0"/>
+              <a:t>Things that I like about the tech.</a:t>
+            </a:r>
+          </a:p>
+        </p:txBody>
+      </p:sp>
+      <p:cxnSp>
+        <p:nvCxnSpPr>
+          <p:cNvPr id="12" name="Straight Connector 11">
+            <a:extLst>
+              <a:ext uri="{FF2B5EF4-FFF2-40B4-BE49-F238E27FC236}">
+                <a16:creationId xmlns:a16="http://schemas.microsoft.com/office/drawing/2014/main" id="{39B7FDC9-F0CE-43A7-9F2A-83DD09DC3453}"/>
+              </a:ext>
+              <a:ext uri="{C183D7F6-B498-43B3-948B-1728B52AA6E4}">
+                <adec:decorative xmlns:adec="http://schemas.microsoft.com/office/drawing/2017/decorative" val="1"/>
+              </a:ext>
+            </a:extLst>
+          </p:cNvPr>
+          <p:cNvCxnSpPr>
+            <a:cxnSpLocks noGrp="1" noRot="1" noChangeAspect="1" noMove="1" noResize="1" noEditPoints="1" noAdjustHandles="1" noChangeArrowheads="1" noChangeShapeType="1"/>
+          </p:cNvCxnSpPr>
+          <p:nvPr>
+            <p:extLst>
+              <p:ext uri="{386F3935-93C4-4BCD-93E2-E3B085C9AB24}">
+                <p16:designElem xmlns:p16="http://schemas.microsoft.com/office/powerpoint/2015/main" val="1"/>
+              </p:ext>
+            </p:extLst>
+          </p:nvPr>
+        </p:nvCxnSpPr>
+        <p:spPr>
+          <a:xfrm>
+            <a:off x="1047624" y="2265037"/>
+            <a:ext cx="10125012" cy="0"/>
+          </a:xfrm>
+          <a:prstGeom prst="line">
+            <a:avLst/>
+          </a:prstGeom>
+          <a:ln w="15875">
+            <a:solidFill>
+              <a:schemeClr val="tx1">
+                <a:lumMod val="65000"/>
+                <a:lumOff val="35000"/>
+              </a:schemeClr>
+            </a:solidFill>
+          </a:ln>
+        </p:spPr>
+        <p:style>
+          <a:lnRef idx="1">
+            <a:schemeClr val="accent1"/>
+          </a:lnRef>
+          <a:fillRef idx="0">
+            <a:schemeClr val="accent1"/>
+          </a:fillRef>
+          <a:effectRef idx="0">
+            <a:schemeClr val="accent1"/>
+          </a:effectRef>
+          <a:fontRef idx="minor">
+            <a:schemeClr val="tx1"/>
+          </a:fontRef>
+        </p:style>
+      </p:cxnSp>
+      <p:pic>
+        <p:nvPicPr>
+          <p:cNvPr id="5" name="Content Placeholder 4" descr="Angel face with solid fill">
+            <a:extLst>
+              <a:ext uri="{FF2B5EF4-FFF2-40B4-BE49-F238E27FC236}">
+                <a16:creationId xmlns:a16="http://schemas.microsoft.com/office/drawing/2014/main" id="{831A082B-9A5E-4DF2-B2E5-B3DB1B6C21F4}"/>
+              </a:ext>
+            </a:extLst>
+          </p:cNvPr>
+          <p:cNvPicPr>
+            <a:picLocks noChangeAspect="1"/>
+          </p:cNvPicPr>
+          <p:nvPr/>
+        </p:nvPicPr>
+        <p:blipFill>
+          <a:blip r:embed="rId2">
+            <a:extLst>
+              <a:ext uri="{28A0092B-C50C-407E-A947-70E740481C1C}">
+                <a14:useLocalDpi xmlns:a14="http://schemas.microsoft.com/office/drawing/2010/main" val="0"/>
+              </a:ext>
+              <a:ext uri="{96DAC541-7B7A-43D3-8B79-37D633B846F1}">
+                <asvg:svgBlip xmlns:asvg="http://schemas.microsoft.com/office/drawing/2016/SVG/main" r:embed="rId3"/>
+              </a:ext>
+            </a:extLst>
+          </a:blip>
+          <a:stretch>
+            <a:fillRect/>
+          </a:stretch>
+        </p:blipFill>
+        <p:spPr>
+          <a:xfrm>
+            <a:off x="1333206" y="2811104"/>
+            <a:ext cx="2928114" cy="2928114"/>
+          </a:xfrm>
+          <a:prstGeom prst="rect">
+            <a:avLst/>
+          </a:prstGeom>
+        </p:spPr>
+      </p:pic>
+      <p:sp>
+        <p:nvSpPr>
+          <p:cNvPr id="9" name="Content Placeholder 8">
+            <a:extLst>
+              <a:ext uri="{FF2B5EF4-FFF2-40B4-BE49-F238E27FC236}">
+                <a16:creationId xmlns:a16="http://schemas.microsoft.com/office/drawing/2014/main" id="{643115F0-0C4F-4E88-9D42-E6C8EBF41A53}"/>
+              </a:ext>
+            </a:extLst>
+          </p:cNvPr>
+          <p:cNvSpPr>
+            <a:spLocks noGrp="1"/>
+          </p:cNvSpPr>
+          <p:nvPr>
+            <p:ph idx="1"/>
+          </p:nvPr>
+        </p:nvSpPr>
+        <p:spPr>
+          <a:xfrm>
+            <a:off x="4955354" y="2682433"/>
+            <a:ext cx="6282169" cy="3215749"/>
+          </a:xfrm>
+        </p:spPr>
+        <p:txBody>
+          <a:bodyPr>
+            <a:normAutofit/>
+          </a:bodyPr>
+          <a:lstStyle/>
+          <a:p>
+            <a:r>
+              <a:rPr lang="en-US" sz="2400" dirty="0"/>
+              <a:t>How dynamic CSS is</a:t>
+            </a:r>
+          </a:p>
+          <a:p>
+            <a:pPr lvl="1"/>
+            <a:r>
+              <a:rPr lang="en-US" sz="2000" dirty="0"/>
+              <a:t>We like the Cascading part of CSS -- More consistent</a:t>
+            </a:r>
+          </a:p>
+          <a:p>
+            <a:r>
+              <a:rPr lang="en-US" sz="2400" dirty="0"/>
+              <a:t>HTML, CSS, JS … more “simple” (faster to learn)</a:t>
+            </a:r>
+          </a:p>
+          <a:p>
+            <a:r>
+              <a:rPr lang="en-US" sz="2400" dirty="0"/>
+              <a:t>We like how </a:t>
+            </a:r>
+            <a:r>
+              <a:rPr lang="en-US" sz="2400" u="sng" dirty="0"/>
+              <a:t>modular</a:t>
+            </a:r>
+            <a:r>
+              <a:rPr lang="en-US" sz="2400" dirty="0"/>
+              <a:t> </a:t>
+            </a:r>
+            <a:r>
+              <a:rPr lang="en-US" sz="2400" dirty="0" err="1"/>
+              <a:t>css</a:t>
+            </a:r>
+            <a:r>
+              <a:rPr lang="en-US" sz="2400" dirty="0"/>
+              <a:t> and </a:t>
+            </a:r>
+            <a:r>
+              <a:rPr lang="en-US" sz="2400" dirty="0" err="1"/>
+              <a:t>js</a:t>
+            </a:r>
+            <a:r>
+              <a:rPr lang="en-US" sz="2400" dirty="0"/>
+              <a:t> are</a:t>
+            </a:r>
+          </a:p>
+          <a:p>
+            <a:r>
+              <a:rPr lang="en-US" sz="2400" dirty="0"/>
+              <a:t>JS is efficient (less lag)</a:t>
+            </a:r>
+          </a:p>
+        </p:txBody>
+      </p:sp>
+    </p:spTree>
+    <p:extLst>
+      <p:ext uri="{BB962C8B-B14F-4D97-AF65-F5344CB8AC3E}">
+        <p14:creationId xmlns:p14="http://schemas.microsoft.com/office/powerpoint/2010/main" val="275338840"/>
+      </p:ext>
+    </p:extLst>
+  </p:cSld>
+  <p:clrMapOvr>
+    <a:masterClrMapping/>
+  </p:clrMapOvr>
+</p:sld>
+</file>
+
+<file path=ppt/slides/slide13.xml><?xml version="1.0" encoding="utf-8"?>
+<p:sld xmlns:a="http://schemas.openxmlformats.org/drawingml/2006/main" xmlns:r="http://schemas.openxmlformats.org/officeDocument/2006/relationships" xmlns:p="http://schemas.openxmlformats.org/presentationml/2006/main">
+  <p:cSld>
+    <p:bg>
+      <p:bgPr>
+        <a:solidFill>
+          <a:schemeClr val="bg1"/>
+        </a:solidFill>
+        <a:effectLst/>
+      </p:bgPr>
+    </p:bg>
+    <p:spTree>
+      <p:nvGrpSpPr>
+        <p:cNvPr id="1" name=""/>
+        <p:cNvGrpSpPr/>
+        <p:nvPr/>
+      </p:nvGrpSpPr>
+      <p:grpSpPr>
+        <a:xfrm>
+          <a:off x="0" y="0"/>
+          <a:ext cx="0" cy="0"/>
+          <a:chOff x="0" y="0"/>
+          <a:chExt cx="0" cy="0"/>
+        </a:xfrm>
+      </p:grpSpPr>
+      <p:sp>
+        <p:nvSpPr>
+          <p:cNvPr id="2" name="Title 1">
+            <a:extLst>
+              <a:ext uri="{FF2B5EF4-FFF2-40B4-BE49-F238E27FC236}">
                 <a16:creationId xmlns:a16="http://schemas.microsoft.com/office/drawing/2014/main" id="{0CC0E406-D236-41FD-BF23-D5B48575375E}"/>
               </a:ext>
             </a:extLst>
@@ -4755,6 +5240,31 @@
             <a:r>
               <a:rPr lang="en-US" sz="2400" dirty="0"/>
               <a:t>Standup meetings (mostly standing up)</a:t>
+            </a:r>
+          </a:p>
+          <a:p>
+            <a:r>
+              <a:rPr lang="en-US" sz="2400" dirty="0"/>
+              <a:t>Having to change multiple copies of same html elements in each file</a:t>
+            </a:r>
+          </a:p>
+          <a:p>
+            <a:r>
+              <a:rPr lang="en-US" sz="2400" dirty="0"/>
+              <a:t>Having to do paddings and margin for text</a:t>
+            </a:r>
+          </a:p>
+          <a:p>
+            <a:pPr lvl="1"/>
+            <a:r>
+              <a:rPr lang="en-US" sz="2000" dirty="0"/>
+              <a:t>Changes depending on browser</a:t>
+            </a:r>
+          </a:p>
+          <a:p>
+            <a:r>
+              <a:rPr lang="en-US" sz="2400" dirty="0"/>
+              <a:t>Dealing with CSS</a:t>
             </a:r>
           </a:p>
         </p:txBody>

</xml_diff>